<commit_message>
completed draft version part-3
</commit_message>
<xml_diff>
--- a/03 Assembly Language/Assembly Language.pptx
+++ b/03 Assembly Language/Assembly Language.pptx
@@ -5,7 +5,7 @@
     <p:sldMasterId id="2147483922" r:id="rId1"/>
   </p:sldMasterIdLst>
   <p:notesMasterIdLst>
-    <p:notesMasterId r:id="rId13"/>
+    <p:notesMasterId r:id="rId23"/>
   </p:notesMasterIdLst>
   <p:sldIdLst>
     <p:sldId id="257" r:id="rId2"/>
@@ -19,6 +19,16 @@
     <p:sldId id="281" r:id="rId10"/>
     <p:sldId id="283" r:id="rId11"/>
     <p:sldId id="284" r:id="rId12"/>
+    <p:sldId id="285" r:id="rId13"/>
+    <p:sldId id="286" r:id="rId14"/>
+    <p:sldId id="287" r:id="rId15"/>
+    <p:sldId id="288" r:id="rId16"/>
+    <p:sldId id="289" r:id="rId17"/>
+    <p:sldId id="290" r:id="rId18"/>
+    <p:sldId id="291" r:id="rId19"/>
+    <p:sldId id="292" r:id="rId20"/>
+    <p:sldId id="293" r:id="rId21"/>
+    <p:sldId id="294" r:id="rId22"/>
   </p:sldIdLst>
   <p:sldSz cx="12192000" cy="6858000"/>
   <p:notesSz cx="6858000" cy="9144000"/>
@@ -10834,7 +10844,7 @@
         </p:spPr>
         <p:txBody>
           <a:bodyPr>
-            <a:normAutofit/>
+            <a:normAutofit lnSpcReduction="10000"/>
           </a:bodyPr>
           <a:lstStyle/>
           <a:p>
@@ -10857,7 +10867,7 @@
               <a:buChar char="•"/>
             </a:pPr>
             <a:r>
-              <a:rPr lang="en-US" sz="1200" dirty="0">
+              <a:rPr lang="en-US" sz="1400" dirty="0">
                 <a:latin typeface="Tahoma" panose="020B0604030504040204" pitchFamily="34" charset="0"/>
                 <a:ea typeface="Tahoma" panose="020B0604030504040204" pitchFamily="34" charset="0"/>
                 <a:cs typeface="Tahoma" panose="020B0604030504040204" pitchFamily="34" charset="0"/>
@@ -10871,7 +10881,7 @@
               <a:buChar char="•"/>
             </a:pPr>
             <a:r>
-              <a:rPr lang="en-US" sz="1200" dirty="0">
+              <a:rPr lang="en-US" sz="1400" dirty="0">
                 <a:latin typeface="Tahoma" panose="020B0604030504040204" pitchFamily="34" charset="0"/>
                 <a:ea typeface="Tahoma" panose="020B0604030504040204" pitchFamily="34" charset="0"/>
                 <a:cs typeface="Tahoma" panose="020B0604030504040204" pitchFamily="34" charset="0"/>
@@ -10885,7 +10895,7 @@
               <a:buChar char="•"/>
             </a:pPr>
             <a:r>
-              <a:rPr lang="en-US" sz="1200" dirty="0">
+              <a:rPr lang="en-US" sz="1400" dirty="0">
                 <a:latin typeface="Tahoma" panose="020B0604030504040204" pitchFamily="34" charset="0"/>
                 <a:ea typeface="Tahoma" panose="020B0604030504040204" pitchFamily="34" charset="0"/>
                 <a:cs typeface="Tahoma" panose="020B0604030504040204" pitchFamily="34" charset="0"/>
@@ -10899,7 +10909,7 @@
               <a:buChar char="•"/>
             </a:pPr>
             <a:r>
-              <a:rPr lang="en-US" sz="1200" dirty="0">
+              <a:rPr lang="en-US" sz="1400" dirty="0">
                 <a:latin typeface="Tahoma" panose="020B0604030504040204" pitchFamily="34" charset="0"/>
                 <a:ea typeface="Tahoma" panose="020B0604030504040204" pitchFamily="34" charset="0"/>
                 <a:cs typeface="Tahoma" panose="020B0604030504040204" pitchFamily="34" charset="0"/>
@@ -10913,7 +10923,7 @@
               <a:buChar char="•"/>
             </a:pPr>
             <a:r>
-              <a:rPr lang="en-US" sz="1200" dirty="0">
+              <a:rPr lang="en-US" sz="1400" dirty="0">
                 <a:latin typeface="Tahoma" panose="020B0604030504040204" pitchFamily="34" charset="0"/>
                 <a:ea typeface="Tahoma" panose="020B0604030504040204" pitchFamily="34" charset="0"/>
                 <a:cs typeface="Tahoma" panose="020B0604030504040204" pitchFamily="34" charset="0"/>
@@ -10927,7 +10937,7 @@
               <a:buChar char="•"/>
             </a:pPr>
             <a:r>
-              <a:rPr lang="en-US" sz="1200" dirty="0">
+              <a:rPr lang="en-US" sz="1400" dirty="0">
                 <a:latin typeface="Tahoma" panose="020B0604030504040204" pitchFamily="34" charset="0"/>
                 <a:ea typeface="Tahoma" panose="020B0604030504040204" pitchFamily="34" charset="0"/>
                 <a:cs typeface="Tahoma" panose="020B0604030504040204" pitchFamily="34" charset="0"/>
@@ -10941,7 +10951,7 @@
               <a:buChar char="•"/>
             </a:pPr>
             <a:r>
-              <a:rPr lang="en-US" sz="1200" dirty="0">
+              <a:rPr lang="en-US" sz="1400" dirty="0">
                 <a:latin typeface="Tahoma" panose="020B0604030504040204" pitchFamily="34" charset="0"/>
                 <a:ea typeface="Tahoma" panose="020B0604030504040204" pitchFamily="34" charset="0"/>
                 <a:cs typeface="Tahoma" panose="020B0604030504040204" pitchFamily="34" charset="0"/>
@@ -10955,7 +10965,7 @@
               <a:buChar char="•"/>
             </a:pPr>
             <a:r>
-              <a:rPr lang="en-US" sz="1200" dirty="0">
+              <a:rPr lang="en-US" sz="1400" dirty="0">
                 <a:latin typeface="Tahoma" panose="020B0604030504040204" pitchFamily="34" charset="0"/>
                 <a:ea typeface="Tahoma" panose="020B0604030504040204" pitchFamily="34" charset="0"/>
                 <a:cs typeface="Tahoma" panose="020B0604030504040204" pitchFamily="34" charset="0"/>
@@ -10969,7 +10979,7 @@
               <a:buChar char="•"/>
             </a:pPr>
             <a:r>
-              <a:rPr lang="en-US" sz="1200" dirty="0">
+              <a:rPr lang="en-US" sz="1400" dirty="0">
                 <a:latin typeface="Tahoma" panose="020B0604030504040204" pitchFamily="34" charset="0"/>
                 <a:ea typeface="Tahoma" panose="020B0604030504040204" pitchFamily="34" charset="0"/>
                 <a:cs typeface="Tahoma" panose="020B0604030504040204" pitchFamily="34" charset="0"/>
@@ -10983,7 +10993,7 @@
               <a:buChar char="•"/>
             </a:pPr>
             <a:r>
-              <a:rPr lang="en-US" sz="1200" dirty="0">
+              <a:rPr lang="en-US" sz="1400" dirty="0">
                 <a:latin typeface="Tahoma" panose="020B0604030504040204" pitchFamily="34" charset="0"/>
                 <a:ea typeface="Tahoma" panose="020B0604030504040204" pitchFamily="34" charset="0"/>
                 <a:cs typeface="Tahoma" panose="020B0604030504040204" pitchFamily="34" charset="0"/>
@@ -10997,7 +11007,7 @@
               <a:buChar char="•"/>
             </a:pPr>
             <a:r>
-              <a:rPr lang="en-US" sz="1200" dirty="0">
+              <a:rPr lang="en-US" sz="1400" dirty="0">
                 <a:latin typeface="Tahoma" panose="020B0604030504040204" pitchFamily="34" charset="0"/>
                 <a:ea typeface="Tahoma" panose="020B0604030504040204" pitchFamily="34" charset="0"/>
                 <a:cs typeface="Tahoma" panose="020B0604030504040204" pitchFamily="34" charset="0"/>
@@ -11011,7 +11021,7 @@
               <a:buChar char="•"/>
             </a:pPr>
             <a:r>
-              <a:rPr lang="en-US" sz="1200" dirty="0">
+              <a:rPr lang="en-US" sz="1400" dirty="0">
                 <a:latin typeface="Tahoma" panose="020B0604030504040204" pitchFamily="34" charset="0"/>
                 <a:ea typeface="Tahoma" panose="020B0604030504040204" pitchFamily="34" charset="0"/>
                 <a:cs typeface="Tahoma" panose="020B0604030504040204" pitchFamily="34" charset="0"/>
@@ -11025,7 +11035,7 @@
               <a:buChar char="•"/>
             </a:pPr>
             <a:r>
-              <a:rPr lang="en-US" sz="1200" dirty="0">
+              <a:rPr lang="en-US" sz="1400" dirty="0">
                 <a:latin typeface="Tahoma" panose="020B0604030504040204" pitchFamily="34" charset="0"/>
                 <a:ea typeface="Tahoma" panose="020B0604030504040204" pitchFamily="34" charset="0"/>
                 <a:cs typeface="Tahoma" panose="020B0604030504040204" pitchFamily="34" charset="0"/>
@@ -11039,7 +11049,7 @@
               <a:buChar char="•"/>
             </a:pPr>
             <a:r>
-              <a:rPr lang="en-US" sz="1200" dirty="0">
+              <a:rPr lang="en-US" sz="1400" dirty="0">
                 <a:latin typeface="Tahoma" panose="020B0604030504040204" pitchFamily="34" charset="0"/>
                 <a:ea typeface="Tahoma" panose="020B0604030504040204" pitchFamily="34" charset="0"/>
                 <a:cs typeface="Tahoma" panose="020B0604030504040204" pitchFamily="34" charset="0"/>
@@ -11053,7 +11063,7 @@
               <a:buChar char="•"/>
             </a:pPr>
             <a:r>
-              <a:rPr lang="en-US" sz="1200" dirty="0">
+              <a:rPr lang="en-US" sz="1400" dirty="0">
                 <a:latin typeface="Tahoma" panose="020B0604030504040204" pitchFamily="34" charset="0"/>
                 <a:ea typeface="Tahoma" panose="020B0604030504040204" pitchFamily="34" charset="0"/>
                 <a:cs typeface="Tahoma" panose="020B0604030504040204" pitchFamily="34" charset="0"/>
@@ -11067,7 +11077,7 @@
               <a:buChar char="•"/>
             </a:pPr>
             <a:r>
-              <a:rPr lang="en-US" sz="1200" dirty="0">
+              <a:rPr lang="en-US" sz="1400" dirty="0">
                 <a:latin typeface="Tahoma" panose="020B0604030504040204" pitchFamily="34" charset="0"/>
                 <a:ea typeface="Tahoma" panose="020B0604030504040204" pitchFamily="34" charset="0"/>
                 <a:cs typeface="Tahoma" panose="020B0604030504040204" pitchFamily="34" charset="0"/>
@@ -11081,7 +11091,7 @@
               <a:buChar char="•"/>
             </a:pPr>
             <a:r>
-              <a:rPr lang="en-US" sz="1200" dirty="0">
+              <a:rPr lang="en-US" sz="1400" dirty="0">
                 <a:latin typeface="Tahoma" panose="020B0604030504040204" pitchFamily="34" charset="0"/>
                 <a:ea typeface="Tahoma" panose="020B0604030504040204" pitchFamily="34" charset="0"/>
                 <a:cs typeface="Tahoma" panose="020B0604030504040204" pitchFamily="34" charset="0"/>
@@ -11139,6 +11149,2155 @@
     <p:extLst>
       <p:ext uri="{BB962C8B-B14F-4D97-AF65-F5344CB8AC3E}">
         <p14:creationId xmlns:p14="http://schemas.microsoft.com/office/powerpoint/2010/main" val="2149433268"/>
+      </p:ext>
+    </p:extLst>
+  </p:cSld>
+  <p:clrMapOvr>
+    <a:masterClrMapping/>
+  </p:clrMapOvr>
+  <mc:AlternateContent xmlns:mc="http://schemas.openxmlformats.org/markup-compatibility/2006" xmlns:p14="http://schemas.microsoft.com/office/powerpoint/2010/main">
+    <mc:Choice Requires="p14">
+      <p:transition spd="slow" p14:dur="1250">
+        <p14:flip dir="r"/>
+      </p:transition>
+    </mc:Choice>
+    <mc:Fallback xmlns="">
+      <p:transition spd="slow">
+        <p:fade/>
+      </p:transition>
+    </mc:Fallback>
+  </mc:AlternateContent>
+</p:sld>
+</file>
+
+<file path=ppt/slides/slide12.xml><?xml version="1.0" encoding="utf-8"?>
+<p:sld xmlns:a="http://schemas.openxmlformats.org/drawingml/2006/main" xmlns:r="http://schemas.openxmlformats.org/officeDocument/2006/relationships" xmlns:p="http://schemas.openxmlformats.org/presentationml/2006/main">
+  <p:cSld>
+    <p:spTree>
+      <p:nvGrpSpPr>
+        <p:cNvPr id="1" name=""/>
+        <p:cNvGrpSpPr/>
+        <p:nvPr/>
+      </p:nvGrpSpPr>
+      <p:grpSpPr>
+        <a:xfrm>
+          <a:off x="0" y="0"/>
+          <a:ext cx="0" cy="0"/>
+          <a:chOff x="0" y="0"/>
+          <a:chExt cx="0" cy="0"/>
+        </a:xfrm>
+      </p:grpSpPr>
+      <p:sp>
+        <p:nvSpPr>
+          <p:cNvPr id="2" name="Title 1">
+            <a:extLst>
+              <a:ext uri="{FF2B5EF4-FFF2-40B4-BE49-F238E27FC236}">
+                <a16:creationId xmlns:a16="http://schemas.microsoft.com/office/drawing/2014/main" id="{C6466A7A-BAA9-4922-81DF-E958EDBA80CF}"/>
+              </a:ext>
+            </a:extLst>
+          </p:cNvPr>
+          <p:cNvSpPr>
+            <a:spLocks noGrp="1"/>
+          </p:cNvSpPr>
+          <p:nvPr>
+            <p:ph type="ctrTitle" idx="4294967295"/>
+          </p:nvPr>
+        </p:nvSpPr>
+        <p:spPr>
+          <a:xfrm>
+            <a:off x="1150215" y="452531"/>
+            <a:ext cx="8361363" cy="552450"/>
+          </a:xfrm>
+        </p:spPr>
+        <p:txBody>
+          <a:bodyPr>
+            <a:normAutofit fontScale="90000"/>
+          </a:bodyPr>
+          <a:lstStyle/>
+          <a:p>
+            <a:r>
+              <a:rPr lang="en-US" sz="4400" dirty="0"/>
+              <a:t>BYTE AND FRIENDS</a:t>
+            </a:r>
+          </a:p>
+        </p:txBody>
+      </p:sp>
+      <p:sp>
+        <p:nvSpPr>
+          <p:cNvPr id="3" name="Subtitle 2">
+            <a:extLst>
+              <a:ext uri="{FF2B5EF4-FFF2-40B4-BE49-F238E27FC236}">
+                <a16:creationId xmlns:a16="http://schemas.microsoft.com/office/drawing/2014/main" id="{E536BDF3-8BC3-4705-A0E0-23EED5878F87}"/>
+              </a:ext>
+            </a:extLst>
+          </p:cNvPr>
+          <p:cNvSpPr>
+            <a:spLocks noGrp="1"/>
+          </p:cNvSpPr>
+          <p:nvPr>
+            <p:ph type="subTitle" idx="4294967295"/>
+          </p:nvPr>
+        </p:nvSpPr>
+        <p:spPr>
+          <a:xfrm>
+            <a:off x="1150300" y="1227138"/>
+            <a:ext cx="9972675" cy="4928002"/>
+          </a:xfrm>
+        </p:spPr>
+        <p:txBody>
+          <a:bodyPr>
+            <a:normAutofit lnSpcReduction="10000"/>
+          </a:bodyPr>
+          <a:lstStyle/>
+          <a:p>
+            <a:r>
+              <a:rPr lang="en-US" sz="1200" dirty="0">
+                <a:solidFill>
+                  <a:schemeClr val="tx2"/>
+                </a:solidFill>
+                <a:latin typeface="Tahoma" panose="020B0604030504040204" pitchFamily="34" charset="0"/>
+                <a:ea typeface="Tahoma" panose="020B0604030504040204" pitchFamily="34" charset="0"/>
+                <a:cs typeface="Tahoma" panose="020B0604030504040204" pitchFamily="34" charset="0"/>
+              </a:rPr>
+              <a:t>Single Initializer</a:t>
+            </a:r>
+          </a:p>
+          <a:p>
+            <a:r>
+              <a:rPr lang="en-US" sz="1200" dirty="0">
+                <a:solidFill>
+                  <a:schemeClr val="tx2"/>
+                </a:solidFill>
+                <a:latin typeface="Tahoma" panose="020B0604030504040204" pitchFamily="34" charset="0"/>
+                <a:ea typeface="Tahoma" panose="020B0604030504040204" pitchFamily="34" charset="0"/>
+                <a:cs typeface="Tahoma" panose="020B0604030504040204" pitchFamily="34" charset="0"/>
+              </a:rPr>
+              <a:t>	VAR1 	BYTE 10 //ALLOCATE 8-BIT</a:t>
+            </a:r>
+          </a:p>
+          <a:p>
+            <a:r>
+              <a:rPr lang="en-US" sz="1200" dirty="0">
+                <a:solidFill>
+                  <a:schemeClr val="tx2"/>
+                </a:solidFill>
+                <a:latin typeface="Tahoma" panose="020B0604030504040204" pitchFamily="34" charset="0"/>
+                <a:ea typeface="Tahoma" panose="020B0604030504040204" pitchFamily="34" charset="0"/>
+                <a:cs typeface="Tahoma" panose="020B0604030504040204" pitchFamily="34" charset="0"/>
+              </a:rPr>
+              <a:t>	VAR2 	SBYTE 10 //8-BIT SIGNED</a:t>
+            </a:r>
+          </a:p>
+          <a:p>
+            <a:r>
+              <a:rPr lang="en-US" sz="1200" dirty="0">
+                <a:solidFill>
+                  <a:schemeClr val="tx2"/>
+                </a:solidFill>
+                <a:latin typeface="Tahoma" panose="020B0604030504040204" pitchFamily="34" charset="0"/>
+                <a:ea typeface="Tahoma" panose="020B0604030504040204" pitchFamily="34" charset="0"/>
+                <a:cs typeface="Tahoma" panose="020B0604030504040204" pitchFamily="34" charset="0"/>
+              </a:rPr>
+              <a:t>	VAR3 	BYTE ? //UN-INITIALIZED, TO-BE ASSIGNED AT RUN-TIME</a:t>
+            </a:r>
+          </a:p>
+          <a:p>
+            <a:r>
+              <a:rPr lang="en-US" sz="1200" dirty="0">
+                <a:solidFill>
+                  <a:schemeClr val="tx2"/>
+                </a:solidFill>
+                <a:latin typeface="Tahoma" panose="020B0604030504040204" pitchFamily="34" charset="0"/>
+                <a:ea typeface="Tahoma" panose="020B0604030504040204" pitchFamily="34" charset="0"/>
+                <a:cs typeface="Tahoma" panose="020B0604030504040204" pitchFamily="34" charset="0"/>
+              </a:rPr>
+              <a:t>	VAR4 	DB 10 //OLD-SCHOOL</a:t>
+            </a:r>
+          </a:p>
+          <a:p>
+            <a:r>
+              <a:rPr lang="en-US" sz="1200" dirty="0">
+                <a:solidFill>
+                  <a:schemeClr val="tx2"/>
+                </a:solidFill>
+                <a:latin typeface="Tahoma" panose="020B0604030504040204" pitchFamily="34" charset="0"/>
+                <a:ea typeface="Tahoma" panose="020B0604030504040204" pitchFamily="34" charset="0"/>
+                <a:cs typeface="Tahoma" panose="020B0604030504040204" pitchFamily="34" charset="0"/>
+              </a:rPr>
+              <a:t>	VAR5	BYTE “Hello-world”,0 //A NULL terminated string with double-quotes</a:t>
+            </a:r>
+          </a:p>
+          <a:p>
+            <a:r>
+              <a:rPr lang="en-US" sz="1200" dirty="0">
+                <a:solidFill>
+                  <a:schemeClr val="tx2"/>
+                </a:solidFill>
+                <a:latin typeface="Tahoma" panose="020B0604030504040204" pitchFamily="34" charset="0"/>
+                <a:ea typeface="Tahoma" panose="020B0604030504040204" pitchFamily="34" charset="0"/>
+                <a:cs typeface="Tahoma" panose="020B0604030504040204" pitchFamily="34" charset="0"/>
+              </a:rPr>
+              <a:t>	VAR6	BYTE ‘Bye-world”,0 //Another NULL terminal string with single-quotes</a:t>
+            </a:r>
+          </a:p>
+          <a:p>
+            <a:endParaRPr lang="en-US" sz="1200" dirty="0">
+              <a:solidFill>
+                <a:schemeClr val="tx2"/>
+              </a:solidFill>
+              <a:latin typeface="Tahoma" panose="020B0604030504040204" pitchFamily="34" charset="0"/>
+              <a:ea typeface="Tahoma" panose="020B0604030504040204" pitchFamily="34" charset="0"/>
+              <a:cs typeface="Tahoma" panose="020B0604030504040204" pitchFamily="34" charset="0"/>
+            </a:endParaRPr>
+          </a:p>
+          <a:p>
+            <a:r>
+              <a:rPr lang="en-US" sz="1200" dirty="0">
+                <a:solidFill>
+                  <a:schemeClr val="tx2"/>
+                </a:solidFill>
+                <a:latin typeface="Tahoma" panose="020B0604030504040204" pitchFamily="34" charset="0"/>
+                <a:ea typeface="Tahoma" panose="020B0604030504040204" pitchFamily="34" charset="0"/>
+                <a:cs typeface="Tahoma" panose="020B0604030504040204" pitchFamily="34" charset="0"/>
+              </a:rPr>
+              <a:t>Multiple Initializers </a:t>
+            </a:r>
+          </a:p>
+          <a:p>
+            <a:r>
+              <a:rPr lang="en-US" sz="1200" dirty="0">
+                <a:solidFill>
+                  <a:schemeClr val="tx2"/>
+                </a:solidFill>
+                <a:latin typeface="Tahoma" panose="020B0604030504040204" pitchFamily="34" charset="0"/>
+                <a:ea typeface="Tahoma" panose="020B0604030504040204" pitchFamily="34" charset="0"/>
+                <a:cs typeface="Tahoma" panose="020B0604030504040204" pitchFamily="34" charset="0"/>
+              </a:rPr>
+              <a:t>	myArray 	BYTE 10, 11, 12 //1-D Array</a:t>
+            </a:r>
+          </a:p>
+          <a:p>
+            <a:r>
+              <a:rPr lang="en-US" sz="1200" dirty="0">
+                <a:solidFill>
+                  <a:schemeClr val="tx2"/>
+                </a:solidFill>
+                <a:latin typeface="Tahoma" panose="020B0604030504040204" pitchFamily="34" charset="0"/>
+                <a:ea typeface="Tahoma" panose="020B0604030504040204" pitchFamily="34" charset="0"/>
+                <a:cs typeface="Tahoma" panose="020B0604030504040204" pitchFamily="34" charset="0"/>
+              </a:rPr>
+              <a:t>	myMatrix    SBYTE 20, 21, 22 //2-D Matrix</a:t>
+            </a:r>
+          </a:p>
+          <a:p>
+            <a:r>
+              <a:rPr lang="en-US" sz="1200" dirty="0">
+                <a:solidFill>
+                  <a:schemeClr val="tx2"/>
+                </a:solidFill>
+                <a:latin typeface="Tahoma" panose="020B0604030504040204" pitchFamily="34" charset="0"/>
+                <a:ea typeface="Tahoma" panose="020B0604030504040204" pitchFamily="34" charset="0"/>
+                <a:cs typeface="Tahoma" panose="020B0604030504040204" pitchFamily="34" charset="0"/>
+              </a:rPr>
+              <a:t>		BYTE 23, 24, 25</a:t>
+            </a:r>
+          </a:p>
+          <a:p>
+            <a:r>
+              <a:rPr lang="en-US" sz="1200" dirty="0">
+                <a:solidFill>
+                  <a:schemeClr val="tx2"/>
+                </a:solidFill>
+                <a:latin typeface="Tahoma" panose="020B0604030504040204" pitchFamily="34" charset="0"/>
+                <a:ea typeface="Tahoma" panose="020B0604030504040204" pitchFamily="34" charset="0"/>
+                <a:cs typeface="Tahoma" panose="020B0604030504040204" pitchFamily="34" charset="0"/>
+              </a:rPr>
+              <a:t>		SBYTE 26, 27, 28</a:t>
+            </a:r>
+          </a:p>
+          <a:p>
+            <a:r>
+              <a:rPr lang="en-US" sz="1200" dirty="0">
+                <a:solidFill>
+                  <a:schemeClr val="tx2"/>
+                </a:solidFill>
+                <a:latin typeface="Tahoma" panose="020B0604030504040204" pitchFamily="34" charset="0"/>
+                <a:ea typeface="Tahoma" panose="020B0604030504040204" pitchFamily="34" charset="0"/>
+                <a:cs typeface="Tahoma" panose="020B0604030504040204" pitchFamily="34" charset="0"/>
+              </a:rPr>
+              <a:t>	myArray2 	BYTE 10 DUP (0) //allocates 10-BYTES and set all bytes to zero</a:t>
+            </a:r>
+          </a:p>
+          <a:p>
+            <a:r>
+              <a:rPr lang="en-US" sz="1200" dirty="0">
+                <a:solidFill>
+                  <a:schemeClr val="tx2"/>
+                </a:solidFill>
+                <a:latin typeface="Tahoma" panose="020B0604030504040204" pitchFamily="34" charset="0"/>
+                <a:ea typeface="Tahoma" panose="020B0604030504040204" pitchFamily="34" charset="0"/>
+                <a:cs typeface="Tahoma" panose="020B0604030504040204" pitchFamily="34" charset="0"/>
+              </a:rPr>
+              <a:t>	myArray3	BYTE 10 DUP (?) //allocates 10-BYTES, un-initialized </a:t>
+            </a:r>
+          </a:p>
+          <a:p>
+            <a:endParaRPr lang="en-US" sz="1200" dirty="0">
+              <a:solidFill>
+                <a:schemeClr val="tx2"/>
+              </a:solidFill>
+              <a:latin typeface="Tahoma" panose="020B0604030504040204" pitchFamily="34" charset="0"/>
+              <a:ea typeface="Tahoma" panose="020B0604030504040204" pitchFamily="34" charset="0"/>
+              <a:cs typeface="Tahoma" panose="020B0604030504040204" pitchFamily="34" charset="0"/>
+            </a:endParaRPr>
+          </a:p>
+        </p:txBody>
+      </p:sp>
+    </p:spTree>
+    <p:extLst>
+      <p:ext uri="{BB962C8B-B14F-4D97-AF65-F5344CB8AC3E}">
+        <p14:creationId xmlns:p14="http://schemas.microsoft.com/office/powerpoint/2010/main" val="3360731510"/>
+      </p:ext>
+    </p:extLst>
+  </p:cSld>
+  <p:clrMapOvr>
+    <a:masterClrMapping/>
+  </p:clrMapOvr>
+  <mc:AlternateContent xmlns:mc="http://schemas.openxmlformats.org/markup-compatibility/2006" xmlns:p14="http://schemas.microsoft.com/office/powerpoint/2010/main">
+    <mc:Choice Requires="p14">
+      <p:transition spd="slow" p14:dur="1250">
+        <p14:flip dir="r"/>
+      </p:transition>
+    </mc:Choice>
+    <mc:Fallback xmlns="">
+      <p:transition spd="slow">
+        <p:fade/>
+      </p:transition>
+    </mc:Fallback>
+  </mc:AlternateContent>
+</p:sld>
+</file>
+
+<file path=ppt/slides/slide13.xml><?xml version="1.0" encoding="utf-8"?>
+<p:sld xmlns:a="http://schemas.openxmlformats.org/drawingml/2006/main" xmlns:r="http://schemas.openxmlformats.org/officeDocument/2006/relationships" xmlns:p="http://schemas.openxmlformats.org/presentationml/2006/main">
+  <p:cSld>
+    <p:spTree>
+      <p:nvGrpSpPr>
+        <p:cNvPr id="1" name=""/>
+        <p:cNvGrpSpPr/>
+        <p:nvPr/>
+      </p:nvGrpSpPr>
+      <p:grpSpPr>
+        <a:xfrm>
+          <a:off x="0" y="0"/>
+          <a:ext cx="0" cy="0"/>
+          <a:chOff x="0" y="0"/>
+          <a:chExt cx="0" cy="0"/>
+        </a:xfrm>
+      </p:grpSpPr>
+      <p:sp>
+        <p:nvSpPr>
+          <p:cNvPr id="2" name="Title 1">
+            <a:extLst>
+              <a:ext uri="{FF2B5EF4-FFF2-40B4-BE49-F238E27FC236}">
+                <a16:creationId xmlns:a16="http://schemas.microsoft.com/office/drawing/2014/main" id="{C6466A7A-BAA9-4922-81DF-E958EDBA80CF}"/>
+              </a:ext>
+            </a:extLst>
+          </p:cNvPr>
+          <p:cNvSpPr>
+            <a:spLocks noGrp="1"/>
+          </p:cNvSpPr>
+          <p:nvPr>
+            <p:ph type="ctrTitle" idx="4294967295"/>
+          </p:nvPr>
+        </p:nvSpPr>
+        <p:spPr>
+          <a:xfrm>
+            <a:off x="1150215" y="452531"/>
+            <a:ext cx="8361363" cy="552450"/>
+          </a:xfrm>
+        </p:spPr>
+        <p:txBody>
+          <a:bodyPr>
+            <a:normAutofit fontScale="90000"/>
+          </a:bodyPr>
+          <a:lstStyle/>
+          <a:p>
+            <a:r>
+              <a:rPr lang="en-US" sz="4400" dirty="0"/>
+              <a:t>WORD AND FRIENDS</a:t>
+            </a:r>
+          </a:p>
+        </p:txBody>
+      </p:sp>
+      <p:sp>
+        <p:nvSpPr>
+          <p:cNvPr id="3" name="Subtitle 2">
+            <a:extLst>
+              <a:ext uri="{FF2B5EF4-FFF2-40B4-BE49-F238E27FC236}">
+                <a16:creationId xmlns:a16="http://schemas.microsoft.com/office/drawing/2014/main" id="{E536BDF3-8BC3-4705-A0E0-23EED5878F87}"/>
+              </a:ext>
+            </a:extLst>
+          </p:cNvPr>
+          <p:cNvSpPr>
+            <a:spLocks noGrp="1"/>
+          </p:cNvSpPr>
+          <p:nvPr>
+            <p:ph type="subTitle" idx="4294967295"/>
+          </p:nvPr>
+        </p:nvSpPr>
+        <p:spPr>
+          <a:xfrm>
+            <a:off x="1150300" y="1227138"/>
+            <a:ext cx="9972675" cy="4928002"/>
+          </a:xfrm>
+        </p:spPr>
+        <p:txBody>
+          <a:bodyPr>
+            <a:normAutofit/>
+          </a:bodyPr>
+          <a:lstStyle/>
+          <a:p>
+            <a:r>
+              <a:rPr lang="en-US" sz="1400" dirty="0">
+                <a:solidFill>
+                  <a:schemeClr val="tx2"/>
+                </a:solidFill>
+                <a:latin typeface="Tahoma" panose="020B0604030504040204" pitchFamily="34" charset="0"/>
+                <a:ea typeface="Tahoma" panose="020B0604030504040204" pitchFamily="34" charset="0"/>
+                <a:cs typeface="Tahoma" panose="020B0604030504040204" pitchFamily="34" charset="0"/>
+              </a:rPr>
+              <a:t>Single Initializer</a:t>
+            </a:r>
+          </a:p>
+          <a:p>
+            <a:r>
+              <a:rPr lang="en-US" sz="1400" dirty="0">
+                <a:solidFill>
+                  <a:schemeClr val="tx2"/>
+                </a:solidFill>
+                <a:latin typeface="Tahoma" panose="020B0604030504040204" pitchFamily="34" charset="0"/>
+                <a:ea typeface="Tahoma" panose="020B0604030504040204" pitchFamily="34" charset="0"/>
+                <a:cs typeface="Tahoma" panose="020B0604030504040204" pitchFamily="34" charset="0"/>
+              </a:rPr>
+              <a:t>	VAR1 	WORD  10  //ALLOCATE 16-BIT</a:t>
+            </a:r>
+          </a:p>
+          <a:p>
+            <a:r>
+              <a:rPr lang="en-US" sz="1400" dirty="0">
+                <a:solidFill>
+                  <a:schemeClr val="tx2"/>
+                </a:solidFill>
+                <a:latin typeface="Tahoma" panose="020B0604030504040204" pitchFamily="34" charset="0"/>
+                <a:ea typeface="Tahoma" panose="020B0604030504040204" pitchFamily="34" charset="0"/>
+                <a:cs typeface="Tahoma" panose="020B0604030504040204" pitchFamily="34" charset="0"/>
+              </a:rPr>
+              <a:t>	VAR2 	SWORD 10  //16-BIT SIGNED</a:t>
+            </a:r>
+          </a:p>
+          <a:p>
+            <a:r>
+              <a:rPr lang="en-US" sz="1400" dirty="0">
+                <a:solidFill>
+                  <a:schemeClr val="tx2"/>
+                </a:solidFill>
+                <a:latin typeface="Tahoma" panose="020B0604030504040204" pitchFamily="34" charset="0"/>
+                <a:ea typeface="Tahoma" panose="020B0604030504040204" pitchFamily="34" charset="0"/>
+                <a:cs typeface="Tahoma" panose="020B0604030504040204" pitchFamily="34" charset="0"/>
+              </a:rPr>
+              <a:t>	VAR3 	WORD  ?   //UN-INITIALIZED, TO-BE ASSIGNED AT RUN-TIME</a:t>
+            </a:r>
+          </a:p>
+          <a:p>
+            <a:r>
+              <a:rPr lang="en-US" sz="1400" dirty="0">
+                <a:solidFill>
+                  <a:schemeClr val="tx2"/>
+                </a:solidFill>
+                <a:latin typeface="Tahoma" panose="020B0604030504040204" pitchFamily="34" charset="0"/>
+                <a:ea typeface="Tahoma" panose="020B0604030504040204" pitchFamily="34" charset="0"/>
+                <a:cs typeface="Tahoma" panose="020B0604030504040204" pitchFamily="34" charset="0"/>
+              </a:rPr>
+              <a:t>	VAR4 	DW    10  //OLD-SCHOOL</a:t>
+            </a:r>
+          </a:p>
+          <a:p>
+            <a:endParaRPr lang="en-US" sz="1400" dirty="0">
+              <a:solidFill>
+                <a:schemeClr val="tx2"/>
+              </a:solidFill>
+              <a:latin typeface="Tahoma" panose="020B0604030504040204" pitchFamily="34" charset="0"/>
+              <a:ea typeface="Tahoma" panose="020B0604030504040204" pitchFamily="34" charset="0"/>
+              <a:cs typeface="Tahoma" panose="020B0604030504040204" pitchFamily="34" charset="0"/>
+            </a:endParaRPr>
+          </a:p>
+          <a:p>
+            <a:r>
+              <a:rPr lang="en-US" sz="1400" dirty="0">
+                <a:solidFill>
+                  <a:schemeClr val="tx2"/>
+                </a:solidFill>
+                <a:latin typeface="Tahoma" panose="020B0604030504040204" pitchFamily="34" charset="0"/>
+                <a:ea typeface="Tahoma" panose="020B0604030504040204" pitchFamily="34" charset="0"/>
+                <a:cs typeface="Tahoma" panose="020B0604030504040204" pitchFamily="34" charset="0"/>
+              </a:rPr>
+              <a:t>Multiple Initializers </a:t>
+            </a:r>
+          </a:p>
+          <a:p>
+            <a:r>
+              <a:rPr lang="en-US" sz="1400" dirty="0">
+                <a:solidFill>
+                  <a:schemeClr val="tx2"/>
+                </a:solidFill>
+                <a:latin typeface="Tahoma" panose="020B0604030504040204" pitchFamily="34" charset="0"/>
+                <a:ea typeface="Tahoma" panose="020B0604030504040204" pitchFamily="34" charset="0"/>
+                <a:cs typeface="Tahoma" panose="020B0604030504040204" pitchFamily="34" charset="0"/>
+              </a:rPr>
+              <a:t>	myArray 	WORD 10, 11, 12  //1-D Array</a:t>
+            </a:r>
+          </a:p>
+          <a:p>
+            <a:r>
+              <a:rPr lang="en-US" sz="1400" dirty="0">
+                <a:solidFill>
+                  <a:schemeClr val="tx2"/>
+                </a:solidFill>
+                <a:latin typeface="Tahoma" panose="020B0604030504040204" pitchFamily="34" charset="0"/>
+                <a:ea typeface="Tahoma" panose="020B0604030504040204" pitchFamily="34" charset="0"/>
+                <a:cs typeface="Tahoma" panose="020B0604030504040204" pitchFamily="34" charset="0"/>
+              </a:rPr>
+              <a:t>	myMatrix    SWORD 20, 21, 22 //2-D Matrix</a:t>
+            </a:r>
+          </a:p>
+          <a:p>
+            <a:r>
+              <a:rPr lang="en-US" sz="1400" dirty="0">
+                <a:solidFill>
+                  <a:schemeClr val="tx2"/>
+                </a:solidFill>
+                <a:latin typeface="Tahoma" panose="020B0604030504040204" pitchFamily="34" charset="0"/>
+                <a:ea typeface="Tahoma" panose="020B0604030504040204" pitchFamily="34" charset="0"/>
+                <a:cs typeface="Tahoma" panose="020B0604030504040204" pitchFamily="34" charset="0"/>
+              </a:rPr>
+              <a:t>				WORD 23, 24, 25</a:t>
+            </a:r>
+          </a:p>
+          <a:p>
+            <a:r>
+              <a:rPr lang="en-US" sz="1400" dirty="0">
+                <a:solidFill>
+                  <a:schemeClr val="tx2"/>
+                </a:solidFill>
+                <a:latin typeface="Tahoma" panose="020B0604030504040204" pitchFamily="34" charset="0"/>
+                <a:ea typeface="Tahoma" panose="020B0604030504040204" pitchFamily="34" charset="0"/>
+                <a:cs typeface="Tahoma" panose="020B0604030504040204" pitchFamily="34" charset="0"/>
+              </a:rPr>
+              <a:t>				SWORD 26, 27, 28</a:t>
+            </a:r>
+          </a:p>
+          <a:p>
+            <a:r>
+              <a:rPr lang="en-US" sz="1400" dirty="0">
+                <a:solidFill>
+                  <a:schemeClr val="tx2"/>
+                </a:solidFill>
+                <a:latin typeface="Tahoma" panose="020B0604030504040204" pitchFamily="34" charset="0"/>
+                <a:ea typeface="Tahoma" panose="020B0604030504040204" pitchFamily="34" charset="0"/>
+                <a:cs typeface="Tahoma" panose="020B0604030504040204" pitchFamily="34" charset="0"/>
+              </a:rPr>
+              <a:t>	myArray2 	WORD 10 DUP (0)  //allocates 10-WORDS and set all WORDs to zero</a:t>
+            </a:r>
+          </a:p>
+          <a:p>
+            <a:r>
+              <a:rPr lang="en-US" sz="1400" dirty="0">
+                <a:solidFill>
+                  <a:schemeClr val="tx2"/>
+                </a:solidFill>
+                <a:latin typeface="Tahoma" panose="020B0604030504040204" pitchFamily="34" charset="0"/>
+                <a:ea typeface="Tahoma" panose="020B0604030504040204" pitchFamily="34" charset="0"/>
+                <a:cs typeface="Tahoma" panose="020B0604030504040204" pitchFamily="34" charset="0"/>
+              </a:rPr>
+              <a:t>	myArray3	WORD 10 DUP (?)  //allocates 10-WORDS, un-initialized</a:t>
+            </a:r>
+          </a:p>
+        </p:txBody>
+      </p:sp>
+    </p:spTree>
+    <p:extLst>
+      <p:ext uri="{BB962C8B-B14F-4D97-AF65-F5344CB8AC3E}">
+        <p14:creationId xmlns:p14="http://schemas.microsoft.com/office/powerpoint/2010/main" val="256865035"/>
+      </p:ext>
+    </p:extLst>
+  </p:cSld>
+  <p:clrMapOvr>
+    <a:masterClrMapping/>
+  </p:clrMapOvr>
+  <mc:AlternateContent xmlns:mc="http://schemas.openxmlformats.org/markup-compatibility/2006" xmlns:p14="http://schemas.microsoft.com/office/powerpoint/2010/main">
+    <mc:Choice Requires="p14">
+      <p:transition spd="slow" p14:dur="1250">
+        <p14:flip dir="r"/>
+      </p:transition>
+    </mc:Choice>
+    <mc:Fallback xmlns="">
+      <p:transition spd="slow">
+        <p:fade/>
+      </p:transition>
+    </mc:Fallback>
+  </mc:AlternateContent>
+</p:sld>
+</file>
+
+<file path=ppt/slides/slide14.xml><?xml version="1.0" encoding="utf-8"?>
+<p:sld xmlns:a="http://schemas.openxmlformats.org/drawingml/2006/main" xmlns:r="http://schemas.openxmlformats.org/officeDocument/2006/relationships" xmlns:p="http://schemas.openxmlformats.org/presentationml/2006/main">
+  <p:cSld>
+    <p:spTree>
+      <p:nvGrpSpPr>
+        <p:cNvPr id="1" name=""/>
+        <p:cNvGrpSpPr/>
+        <p:nvPr/>
+      </p:nvGrpSpPr>
+      <p:grpSpPr>
+        <a:xfrm>
+          <a:off x="0" y="0"/>
+          <a:ext cx="0" cy="0"/>
+          <a:chOff x="0" y="0"/>
+          <a:chExt cx="0" cy="0"/>
+        </a:xfrm>
+      </p:grpSpPr>
+      <p:sp>
+        <p:nvSpPr>
+          <p:cNvPr id="2" name="Title 1">
+            <a:extLst>
+              <a:ext uri="{FF2B5EF4-FFF2-40B4-BE49-F238E27FC236}">
+                <a16:creationId xmlns:a16="http://schemas.microsoft.com/office/drawing/2014/main" id="{C6466A7A-BAA9-4922-81DF-E958EDBA80CF}"/>
+              </a:ext>
+            </a:extLst>
+          </p:cNvPr>
+          <p:cNvSpPr>
+            <a:spLocks noGrp="1"/>
+          </p:cNvSpPr>
+          <p:nvPr>
+            <p:ph type="ctrTitle" idx="4294967295"/>
+          </p:nvPr>
+        </p:nvSpPr>
+        <p:spPr>
+          <a:xfrm>
+            <a:off x="1150215" y="452531"/>
+            <a:ext cx="8361363" cy="552450"/>
+          </a:xfrm>
+        </p:spPr>
+        <p:txBody>
+          <a:bodyPr>
+            <a:normAutofit fontScale="90000"/>
+          </a:bodyPr>
+          <a:lstStyle/>
+          <a:p>
+            <a:r>
+              <a:rPr lang="en-US" sz="4400" dirty="0"/>
+              <a:t>DWORD AND FRIENDS</a:t>
+            </a:r>
+          </a:p>
+        </p:txBody>
+      </p:sp>
+      <p:sp>
+        <p:nvSpPr>
+          <p:cNvPr id="3" name="Subtitle 2">
+            <a:extLst>
+              <a:ext uri="{FF2B5EF4-FFF2-40B4-BE49-F238E27FC236}">
+                <a16:creationId xmlns:a16="http://schemas.microsoft.com/office/drawing/2014/main" id="{E536BDF3-8BC3-4705-A0E0-23EED5878F87}"/>
+              </a:ext>
+            </a:extLst>
+          </p:cNvPr>
+          <p:cNvSpPr>
+            <a:spLocks noGrp="1"/>
+          </p:cNvSpPr>
+          <p:nvPr>
+            <p:ph type="subTitle" idx="4294967295"/>
+          </p:nvPr>
+        </p:nvSpPr>
+        <p:spPr>
+          <a:xfrm>
+            <a:off x="1150300" y="1227138"/>
+            <a:ext cx="9972675" cy="4928002"/>
+          </a:xfrm>
+        </p:spPr>
+        <p:txBody>
+          <a:bodyPr>
+            <a:normAutofit/>
+          </a:bodyPr>
+          <a:lstStyle/>
+          <a:p>
+            <a:r>
+              <a:rPr lang="en-US" sz="1400" dirty="0">
+                <a:solidFill>
+                  <a:schemeClr val="tx2"/>
+                </a:solidFill>
+                <a:latin typeface="Tahoma" panose="020B0604030504040204" pitchFamily="34" charset="0"/>
+                <a:ea typeface="Tahoma" panose="020B0604030504040204" pitchFamily="34" charset="0"/>
+                <a:cs typeface="Tahoma" panose="020B0604030504040204" pitchFamily="34" charset="0"/>
+              </a:rPr>
+              <a:t>Single Initializer</a:t>
+            </a:r>
+          </a:p>
+          <a:p>
+            <a:r>
+              <a:rPr lang="en-US" sz="1400" dirty="0">
+                <a:solidFill>
+                  <a:schemeClr val="tx2"/>
+                </a:solidFill>
+                <a:latin typeface="Tahoma" panose="020B0604030504040204" pitchFamily="34" charset="0"/>
+                <a:ea typeface="Tahoma" panose="020B0604030504040204" pitchFamily="34" charset="0"/>
+                <a:cs typeface="Tahoma" panose="020B0604030504040204" pitchFamily="34" charset="0"/>
+              </a:rPr>
+              <a:t>	VAR1 	DWORD  10  //ALLOCATE 32-BIT</a:t>
+            </a:r>
+          </a:p>
+          <a:p>
+            <a:r>
+              <a:rPr lang="en-US" sz="1400" dirty="0">
+                <a:solidFill>
+                  <a:schemeClr val="tx2"/>
+                </a:solidFill>
+                <a:latin typeface="Tahoma" panose="020B0604030504040204" pitchFamily="34" charset="0"/>
+                <a:ea typeface="Tahoma" panose="020B0604030504040204" pitchFamily="34" charset="0"/>
+                <a:cs typeface="Tahoma" panose="020B0604030504040204" pitchFamily="34" charset="0"/>
+              </a:rPr>
+              <a:t>	VAR2 	SDWORD 10  //32-BIT SIGNED</a:t>
+            </a:r>
+          </a:p>
+          <a:p>
+            <a:r>
+              <a:rPr lang="en-US" sz="1400" dirty="0">
+                <a:solidFill>
+                  <a:schemeClr val="tx2"/>
+                </a:solidFill>
+                <a:latin typeface="Tahoma" panose="020B0604030504040204" pitchFamily="34" charset="0"/>
+                <a:ea typeface="Tahoma" panose="020B0604030504040204" pitchFamily="34" charset="0"/>
+                <a:cs typeface="Tahoma" panose="020B0604030504040204" pitchFamily="34" charset="0"/>
+              </a:rPr>
+              <a:t>	VAR3 	DWORD  ?   //UN-INITIALIZED, TO-BE ASSIGNED AT RUN-TIME</a:t>
+            </a:r>
+          </a:p>
+          <a:p>
+            <a:r>
+              <a:rPr lang="en-US" sz="1400" dirty="0">
+                <a:solidFill>
+                  <a:schemeClr val="tx2"/>
+                </a:solidFill>
+                <a:latin typeface="Tahoma" panose="020B0604030504040204" pitchFamily="34" charset="0"/>
+                <a:ea typeface="Tahoma" panose="020B0604030504040204" pitchFamily="34" charset="0"/>
+                <a:cs typeface="Tahoma" panose="020B0604030504040204" pitchFamily="34" charset="0"/>
+              </a:rPr>
+              <a:t>	VAR4 	DD    10   //OLD-SCHOOL</a:t>
+            </a:r>
+          </a:p>
+          <a:p>
+            <a:endParaRPr lang="en-US" sz="1400" dirty="0">
+              <a:solidFill>
+                <a:schemeClr val="tx2"/>
+              </a:solidFill>
+              <a:latin typeface="Tahoma" panose="020B0604030504040204" pitchFamily="34" charset="0"/>
+              <a:ea typeface="Tahoma" panose="020B0604030504040204" pitchFamily="34" charset="0"/>
+              <a:cs typeface="Tahoma" panose="020B0604030504040204" pitchFamily="34" charset="0"/>
+            </a:endParaRPr>
+          </a:p>
+          <a:p>
+            <a:r>
+              <a:rPr lang="en-US" sz="1400" dirty="0">
+                <a:solidFill>
+                  <a:schemeClr val="tx2"/>
+                </a:solidFill>
+                <a:latin typeface="Tahoma" panose="020B0604030504040204" pitchFamily="34" charset="0"/>
+                <a:ea typeface="Tahoma" panose="020B0604030504040204" pitchFamily="34" charset="0"/>
+                <a:cs typeface="Tahoma" panose="020B0604030504040204" pitchFamily="34" charset="0"/>
+              </a:rPr>
+              <a:t>Multiple Initializers </a:t>
+            </a:r>
+          </a:p>
+          <a:p>
+            <a:r>
+              <a:rPr lang="en-US" sz="1400" dirty="0">
+                <a:solidFill>
+                  <a:schemeClr val="tx2"/>
+                </a:solidFill>
+                <a:latin typeface="Tahoma" panose="020B0604030504040204" pitchFamily="34" charset="0"/>
+                <a:ea typeface="Tahoma" panose="020B0604030504040204" pitchFamily="34" charset="0"/>
+                <a:cs typeface="Tahoma" panose="020B0604030504040204" pitchFamily="34" charset="0"/>
+              </a:rPr>
+              <a:t>	myArray 	DWORD 10, 11, 12  //1-D Array</a:t>
+            </a:r>
+          </a:p>
+          <a:p>
+            <a:r>
+              <a:rPr lang="en-US" sz="1400" dirty="0">
+                <a:solidFill>
+                  <a:schemeClr val="tx2"/>
+                </a:solidFill>
+                <a:latin typeface="Tahoma" panose="020B0604030504040204" pitchFamily="34" charset="0"/>
+                <a:ea typeface="Tahoma" panose="020B0604030504040204" pitchFamily="34" charset="0"/>
+                <a:cs typeface="Tahoma" panose="020B0604030504040204" pitchFamily="34" charset="0"/>
+              </a:rPr>
+              <a:t>	myMatrix    SDWORD 20, 21, 22 //2-D Matrix</a:t>
+            </a:r>
+          </a:p>
+          <a:p>
+            <a:r>
+              <a:rPr lang="en-US" sz="1400" dirty="0">
+                <a:solidFill>
+                  <a:schemeClr val="tx2"/>
+                </a:solidFill>
+                <a:latin typeface="Tahoma" panose="020B0604030504040204" pitchFamily="34" charset="0"/>
+                <a:ea typeface="Tahoma" panose="020B0604030504040204" pitchFamily="34" charset="0"/>
+                <a:cs typeface="Tahoma" panose="020B0604030504040204" pitchFamily="34" charset="0"/>
+              </a:rPr>
+              <a:t>				DWORD 23, 24, 25</a:t>
+            </a:r>
+          </a:p>
+          <a:p>
+            <a:r>
+              <a:rPr lang="en-US" sz="1400" dirty="0">
+                <a:solidFill>
+                  <a:schemeClr val="tx2"/>
+                </a:solidFill>
+                <a:latin typeface="Tahoma" panose="020B0604030504040204" pitchFamily="34" charset="0"/>
+                <a:ea typeface="Tahoma" panose="020B0604030504040204" pitchFamily="34" charset="0"/>
+                <a:cs typeface="Tahoma" panose="020B0604030504040204" pitchFamily="34" charset="0"/>
+              </a:rPr>
+              <a:t>				SDWORD 26, 27, 28</a:t>
+            </a:r>
+          </a:p>
+          <a:p>
+            <a:r>
+              <a:rPr lang="en-US" sz="1400" dirty="0">
+                <a:solidFill>
+                  <a:schemeClr val="tx2"/>
+                </a:solidFill>
+                <a:latin typeface="Tahoma" panose="020B0604030504040204" pitchFamily="34" charset="0"/>
+                <a:ea typeface="Tahoma" panose="020B0604030504040204" pitchFamily="34" charset="0"/>
+                <a:cs typeface="Tahoma" panose="020B0604030504040204" pitchFamily="34" charset="0"/>
+              </a:rPr>
+              <a:t>	myArray2 	DWORD 10 DUP (0)  //allocates 10-DWORDS and set all DWORDs to zero</a:t>
+            </a:r>
+          </a:p>
+          <a:p>
+            <a:r>
+              <a:rPr lang="en-US" sz="1400" dirty="0">
+                <a:solidFill>
+                  <a:schemeClr val="tx2"/>
+                </a:solidFill>
+                <a:latin typeface="Tahoma" panose="020B0604030504040204" pitchFamily="34" charset="0"/>
+                <a:ea typeface="Tahoma" panose="020B0604030504040204" pitchFamily="34" charset="0"/>
+                <a:cs typeface="Tahoma" panose="020B0604030504040204" pitchFamily="34" charset="0"/>
+              </a:rPr>
+              <a:t>	myArray3	DWORD 10 DUP (?)  //allocates 10-DWORDS, un-initialized</a:t>
+            </a:r>
+          </a:p>
+          <a:p>
+            <a:endParaRPr lang="en-US" sz="1400" dirty="0">
+              <a:solidFill>
+                <a:schemeClr val="tx2"/>
+              </a:solidFill>
+              <a:latin typeface="Tahoma" panose="020B0604030504040204" pitchFamily="34" charset="0"/>
+              <a:ea typeface="Tahoma" panose="020B0604030504040204" pitchFamily="34" charset="0"/>
+              <a:cs typeface="Tahoma" panose="020B0604030504040204" pitchFamily="34" charset="0"/>
+            </a:endParaRPr>
+          </a:p>
+        </p:txBody>
+      </p:sp>
+    </p:spTree>
+    <p:extLst>
+      <p:ext uri="{BB962C8B-B14F-4D97-AF65-F5344CB8AC3E}">
+        <p14:creationId xmlns:p14="http://schemas.microsoft.com/office/powerpoint/2010/main" val="3070865592"/>
+      </p:ext>
+    </p:extLst>
+  </p:cSld>
+  <p:clrMapOvr>
+    <a:masterClrMapping/>
+  </p:clrMapOvr>
+  <mc:AlternateContent xmlns:mc="http://schemas.openxmlformats.org/markup-compatibility/2006" xmlns:p14="http://schemas.microsoft.com/office/powerpoint/2010/main">
+    <mc:Choice Requires="p14">
+      <p:transition spd="slow" p14:dur="1250">
+        <p14:flip dir="r"/>
+      </p:transition>
+    </mc:Choice>
+    <mc:Fallback xmlns="">
+      <p:transition spd="slow">
+        <p:fade/>
+      </p:transition>
+    </mc:Fallback>
+  </mc:AlternateContent>
+</p:sld>
+</file>
+
+<file path=ppt/slides/slide15.xml><?xml version="1.0" encoding="utf-8"?>
+<p:sld xmlns:a="http://schemas.openxmlformats.org/drawingml/2006/main" xmlns:r="http://schemas.openxmlformats.org/officeDocument/2006/relationships" xmlns:p="http://schemas.openxmlformats.org/presentationml/2006/main">
+  <p:cSld>
+    <p:spTree>
+      <p:nvGrpSpPr>
+        <p:cNvPr id="1" name=""/>
+        <p:cNvGrpSpPr/>
+        <p:nvPr/>
+      </p:nvGrpSpPr>
+      <p:grpSpPr>
+        <a:xfrm>
+          <a:off x="0" y="0"/>
+          <a:ext cx="0" cy="0"/>
+          <a:chOff x="0" y="0"/>
+          <a:chExt cx="0" cy="0"/>
+        </a:xfrm>
+      </p:grpSpPr>
+      <p:sp>
+        <p:nvSpPr>
+          <p:cNvPr id="2" name="Title 1">
+            <a:extLst>
+              <a:ext uri="{FF2B5EF4-FFF2-40B4-BE49-F238E27FC236}">
+                <a16:creationId xmlns:a16="http://schemas.microsoft.com/office/drawing/2014/main" id="{C6466A7A-BAA9-4922-81DF-E958EDBA80CF}"/>
+              </a:ext>
+            </a:extLst>
+          </p:cNvPr>
+          <p:cNvSpPr>
+            <a:spLocks noGrp="1"/>
+          </p:cNvSpPr>
+          <p:nvPr>
+            <p:ph type="ctrTitle" idx="4294967295"/>
+          </p:nvPr>
+        </p:nvSpPr>
+        <p:spPr>
+          <a:xfrm>
+            <a:off x="1150215" y="452531"/>
+            <a:ext cx="8361363" cy="552450"/>
+          </a:xfrm>
+        </p:spPr>
+        <p:txBody>
+          <a:bodyPr>
+            <a:normAutofit fontScale="90000"/>
+          </a:bodyPr>
+          <a:lstStyle/>
+          <a:p>
+            <a:r>
+              <a:rPr lang="en-US" sz="4400" dirty="0"/>
+              <a:t>QWORD AND FRIENDS</a:t>
+            </a:r>
+          </a:p>
+        </p:txBody>
+      </p:sp>
+      <p:sp>
+        <p:nvSpPr>
+          <p:cNvPr id="3" name="Subtitle 2">
+            <a:extLst>
+              <a:ext uri="{FF2B5EF4-FFF2-40B4-BE49-F238E27FC236}">
+                <a16:creationId xmlns:a16="http://schemas.microsoft.com/office/drawing/2014/main" id="{E536BDF3-8BC3-4705-A0E0-23EED5878F87}"/>
+              </a:ext>
+            </a:extLst>
+          </p:cNvPr>
+          <p:cNvSpPr>
+            <a:spLocks noGrp="1"/>
+          </p:cNvSpPr>
+          <p:nvPr>
+            <p:ph type="subTitle" idx="4294967295"/>
+          </p:nvPr>
+        </p:nvSpPr>
+        <p:spPr>
+          <a:xfrm>
+            <a:off x="1150300" y="1227138"/>
+            <a:ext cx="9972675" cy="4928002"/>
+          </a:xfrm>
+        </p:spPr>
+        <p:txBody>
+          <a:bodyPr>
+            <a:normAutofit/>
+          </a:bodyPr>
+          <a:lstStyle/>
+          <a:p>
+            <a:r>
+              <a:rPr lang="en-US" sz="1400" dirty="0">
+                <a:solidFill>
+                  <a:schemeClr val="tx2"/>
+                </a:solidFill>
+                <a:latin typeface="Tahoma" panose="020B0604030504040204" pitchFamily="34" charset="0"/>
+                <a:ea typeface="Tahoma" panose="020B0604030504040204" pitchFamily="34" charset="0"/>
+                <a:cs typeface="Tahoma" panose="020B0604030504040204" pitchFamily="34" charset="0"/>
+              </a:rPr>
+              <a:t>Single Initializer</a:t>
+            </a:r>
+          </a:p>
+          <a:p>
+            <a:r>
+              <a:rPr lang="en-US" sz="1400" dirty="0">
+                <a:solidFill>
+                  <a:schemeClr val="tx2"/>
+                </a:solidFill>
+                <a:latin typeface="Tahoma" panose="020B0604030504040204" pitchFamily="34" charset="0"/>
+                <a:ea typeface="Tahoma" panose="020B0604030504040204" pitchFamily="34" charset="0"/>
+                <a:cs typeface="Tahoma" panose="020B0604030504040204" pitchFamily="34" charset="0"/>
+              </a:rPr>
+              <a:t>	VAR1 	QWORD  10  //ALLOCATE 64-BIT</a:t>
+            </a:r>
+          </a:p>
+          <a:p>
+            <a:pPr marL="0" indent="0">
+              <a:buNone/>
+            </a:pPr>
+            <a:r>
+              <a:rPr lang="en-US" sz="1400" dirty="0">
+                <a:solidFill>
+                  <a:schemeClr val="tx2"/>
+                </a:solidFill>
+                <a:latin typeface="Tahoma" panose="020B0604030504040204" pitchFamily="34" charset="0"/>
+                <a:ea typeface="Tahoma" panose="020B0604030504040204" pitchFamily="34" charset="0"/>
+                <a:cs typeface="Tahoma" panose="020B0604030504040204" pitchFamily="34" charset="0"/>
+              </a:rPr>
+              <a:t>	VAR2 	QWORD  ?   //UN-INITIALIZED, TO-BE ASSIGNED AT RUN-TIME</a:t>
+            </a:r>
+          </a:p>
+          <a:p>
+            <a:r>
+              <a:rPr lang="en-US" sz="1400" dirty="0">
+                <a:solidFill>
+                  <a:schemeClr val="tx2"/>
+                </a:solidFill>
+                <a:latin typeface="Tahoma" panose="020B0604030504040204" pitchFamily="34" charset="0"/>
+                <a:ea typeface="Tahoma" panose="020B0604030504040204" pitchFamily="34" charset="0"/>
+                <a:cs typeface="Tahoma" panose="020B0604030504040204" pitchFamily="34" charset="0"/>
+              </a:rPr>
+              <a:t>	VAR3 	DQ    10   //OLD-SCHOOL</a:t>
+            </a:r>
+          </a:p>
+          <a:p>
+            <a:endParaRPr lang="en-US" sz="1400" dirty="0">
+              <a:solidFill>
+                <a:schemeClr val="tx2"/>
+              </a:solidFill>
+              <a:latin typeface="Tahoma" panose="020B0604030504040204" pitchFamily="34" charset="0"/>
+              <a:ea typeface="Tahoma" panose="020B0604030504040204" pitchFamily="34" charset="0"/>
+              <a:cs typeface="Tahoma" panose="020B0604030504040204" pitchFamily="34" charset="0"/>
+            </a:endParaRPr>
+          </a:p>
+          <a:p>
+            <a:r>
+              <a:rPr lang="en-US" sz="1400" dirty="0">
+                <a:solidFill>
+                  <a:schemeClr val="tx2"/>
+                </a:solidFill>
+                <a:latin typeface="Tahoma" panose="020B0604030504040204" pitchFamily="34" charset="0"/>
+                <a:ea typeface="Tahoma" panose="020B0604030504040204" pitchFamily="34" charset="0"/>
+                <a:cs typeface="Tahoma" panose="020B0604030504040204" pitchFamily="34" charset="0"/>
+              </a:rPr>
+              <a:t>Multiple Initializers </a:t>
+            </a:r>
+          </a:p>
+          <a:p>
+            <a:r>
+              <a:rPr lang="en-US" sz="1400" dirty="0">
+                <a:solidFill>
+                  <a:schemeClr val="tx2"/>
+                </a:solidFill>
+                <a:latin typeface="Tahoma" panose="020B0604030504040204" pitchFamily="34" charset="0"/>
+                <a:ea typeface="Tahoma" panose="020B0604030504040204" pitchFamily="34" charset="0"/>
+                <a:cs typeface="Tahoma" panose="020B0604030504040204" pitchFamily="34" charset="0"/>
+              </a:rPr>
+              <a:t>	myArray 	QWORD 10, 11, 12  //1-D Array</a:t>
+            </a:r>
+          </a:p>
+          <a:p>
+            <a:r>
+              <a:rPr lang="en-US" sz="1400" dirty="0">
+                <a:solidFill>
+                  <a:schemeClr val="tx2"/>
+                </a:solidFill>
+                <a:latin typeface="Tahoma" panose="020B0604030504040204" pitchFamily="34" charset="0"/>
+                <a:ea typeface="Tahoma" panose="020B0604030504040204" pitchFamily="34" charset="0"/>
+                <a:cs typeface="Tahoma" panose="020B0604030504040204" pitchFamily="34" charset="0"/>
+              </a:rPr>
+              <a:t>	myMatrix    QWORD 20, 21, 22 //2-D Matrix</a:t>
+            </a:r>
+          </a:p>
+          <a:p>
+            <a:r>
+              <a:rPr lang="en-US" sz="1400" dirty="0">
+                <a:solidFill>
+                  <a:schemeClr val="tx2"/>
+                </a:solidFill>
+                <a:latin typeface="Tahoma" panose="020B0604030504040204" pitchFamily="34" charset="0"/>
+                <a:ea typeface="Tahoma" panose="020B0604030504040204" pitchFamily="34" charset="0"/>
+                <a:cs typeface="Tahoma" panose="020B0604030504040204" pitchFamily="34" charset="0"/>
+              </a:rPr>
+              <a:t>		QWORD 23, 24, 25</a:t>
+            </a:r>
+          </a:p>
+          <a:p>
+            <a:r>
+              <a:rPr lang="en-US" sz="1400" dirty="0">
+                <a:solidFill>
+                  <a:schemeClr val="tx2"/>
+                </a:solidFill>
+                <a:latin typeface="Tahoma" panose="020B0604030504040204" pitchFamily="34" charset="0"/>
+                <a:ea typeface="Tahoma" panose="020B0604030504040204" pitchFamily="34" charset="0"/>
+                <a:cs typeface="Tahoma" panose="020B0604030504040204" pitchFamily="34" charset="0"/>
+              </a:rPr>
+              <a:t>		QWORD 26, 27, 28</a:t>
+            </a:r>
+          </a:p>
+          <a:p>
+            <a:r>
+              <a:rPr lang="en-US" sz="1400" dirty="0">
+                <a:solidFill>
+                  <a:schemeClr val="tx2"/>
+                </a:solidFill>
+                <a:latin typeface="Tahoma" panose="020B0604030504040204" pitchFamily="34" charset="0"/>
+                <a:ea typeface="Tahoma" panose="020B0604030504040204" pitchFamily="34" charset="0"/>
+                <a:cs typeface="Tahoma" panose="020B0604030504040204" pitchFamily="34" charset="0"/>
+              </a:rPr>
+              <a:t>	myArray2 	QWORD 10 DUP (0)  //allocates 10-QWORDS and set all QWORDs to zero</a:t>
+            </a:r>
+          </a:p>
+          <a:p>
+            <a:r>
+              <a:rPr lang="en-US" sz="1400" dirty="0">
+                <a:solidFill>
+                  <a:schemeClr val="tx2"/>
+                </a:solidFill>
+                <a:latin typeface="Tahoma" panose="020B0604030504040204" pitchFamily="34" charset="0"/>
+                <a:ea typeface="Tahoma" panose="020B0604030504040204" pitchFamily="34" charset="0"/>
+                <a:cs typeface="Tahoma" panose="020B0604030504040204" pitchFamily="34" charset="0"/>
+              </a:rPr>
+              <a:t>	myArray3	QWORD 10 DUP (?)  //allocates 10-QWORDS, un-initialized</a:t>
+            </a:r>
+          </a:p>
+        </p:txBody>
+      </p:sp>
+    </p:spTree>
+    <p:extLst>
+      <p:ext uri="{BB962C8B-B14F-4D97-AF65-F5344CB8AC3E}">
+        <p14:creationId xmlns:p14="http://schemas.microsoft.com/office/powerpoint/2010/main" val="19904121"/>
+      </p:ext>
+    </p:extLst>
+  </p:cSld>
+  <p:clrMapOvr>
+    <a:masterClrMapping/>
+  </p:clrMapOvr>
+  <mc:AlternateContent xmlns:mc="http://schemas.openxmlformats.org/markup-compatibility/2006" xmlns:p14="http://schemas.microsoft.com/office/powerpoint/2010/main">
+    <mc:Choice Requires="p14">
+      <p:transition spd="slow" p14:dur="1250">
+        <p14:flip dir="r"/>
+      </p:transition>
+    </mc:Choice>
+    <mc:Fallback xmlns="">
+      <p:transition spd="slow">
+        <p:fade/>
+      </p:transition>
+    </mc:Fallback>
+  </mc:AlternateContent>
+</p:sld>
+</file>
+
+<file path=ppt/slides/slide16.xml><?xml version="1.0" encoding="utf-8"?>
+<p:sld xmlns:a="http://schemas.openxmlformats.org/drawingml/2006/main" xmlns:r="http://schemas.openxmlformats.org/officeDocument/2006/relationships" xmlns:p="http://schemas.openxmlformats.org/presentationml/2006/main">
+  <p:cSld>
+    <p:spTree>
+      <p:nvGrpSpPr>
+        <p:cNvPr id="1" name=""/>
+        <p:cNvGrpSpPr/>
+        <p:nvPr/>
+      </p:nvGrpSpPr>
+      <p:grpSpPr>
+        <a:xfrm>
+          <a:off x="0" y="0"/>
+          <a:ext cx="0" cy="0"/>
+          <a:chOff x="0" y="0"/>
+          <a:chExt cx="0" cy="0"/>
+        </a:xfrm>
+      </p:grpSpPr>
+      <p:sp>
+        <p:nvSpPr>
+          <p:cNvPr id="2" name="Title 1">
+            <a:extLst>
+              <a:ext uri="{FF2B5EF4-FFF2-40B4-BE49-F238E27FC236}">
+                <a16:creationId xmlns:a16="http://schemas.microsoft.com/office/drawing/2014/main" id="{C6466A7A-BAA9-4922-81DF-E958EDBA80CF}"/>
+              </a:ext>
+            </a:extLst>
+          </p:cNvPr>
+          <p:cNvSpPr>
+            <a:spLocks noGrp="1"/>
+          </p:cNvSpPr>
+          <p:nvPr>
+            <p:ph type="ctrTitle" idx="4294967295"/>
+          </p:nvPr>
+        </p:nvSpPr>
+        <p:spPr>
+          <a:xfrm>
+            <a:off x="1150215" y="452531"/>
+            <a:ext cx="8361363" cy="552450"/>
+          </a:xfrm>
+        </p:spPr>
+        <p:txBody>
+          <a:bodyPr>
+            <a:noAutofit/>
+          </a:bodyPr>
+          <a:lstStyle/>
+          <a:p>
+            <a:r>
+              <a:rPr lang="en-US" sz="3600" dirty="0"/>
+              <a:t>TBYTE/PACKED BCD(BINARY CODED DECIMAL)</a:t>
+            </a:r>
+          </a:p>
+        </p:txBody>
+      </p:sp>
+      <p:sp>
+        <p:nvSpPr>
+          <p:cNvPr id="3" name="Subtitle 2">
+            <a:extLst>
+              <a:ext uri="{FF2B5EF4-FFF2-40B4-BE49-F238E27FC236}">
+                <a16:creationId xmlns:a16="http://schemas.microsoft.com/office/drawing/2014/main" id="{E536BDF3-8BC3-4705-A0E0-23EED5878F87}"/>
+              </a:ext>
+            </a:extLst>
+          </p:cNvPr>
+          <p:cNvSpPr>
+            <a:spLocks noGrp="1"/>
+          </p:cNvSpPr>
+          <p:nvPr>
+            <p:ph type="subTitle" idx="4294967295"/>
+          </p:nvPr>
+        </p:nvSpPr>
+        <p:spPr>
+          <a:xfrm>
+            <a:off x="1150300" y="1227138"/>
+            <a:ext cx="9972675" cy="4928002"/>
+          </a:xfrm>
+        </p:spPr>
+        <p:txBody>
+          <a:bodyPr>
+            <a:normAutofit/>
+          </a:bodyPr>
+          <a:lstStyle/>
+          <a:p>
+            <a:pPr marL="0" indent="0">
+              <a:buNone/>
+            </a:pPr>
+            <a:r>
+              <a:rPr lang="en-US" sz="1400" dirty="0">
+                <a:solidFill>
+                  <a:schemeClr val="tx2"/>
+                </a:solidFill>
+                <a:latin typeface="Tahoma" panose="020B0604030504040204" pitchFamily="34" charset="0"/>
+                <a:ea typeface="Tahoma" panose="020B0604030504040204" pitchFamily="34" charset="0"/>
+                <a:cs typeface="Tahoma" panose="020B0604030504040204" pitchFamily="34" charset="0"/>
+              </a:rPr>
+              <a:t>10-BYTES or 80-BIT //size</a:t>
+            </a:r>
+          </a:p>
+          <a:p>
+            <a:pPr marL="0" indent="0">
+              <a:buNone/>
+            </a:pPr>
+            <a:r>
+              <a:rPr lang="en-US" sz="1400" dirty="0">
+                <a:solidFill>
+                  <a:schemeClr val="tx2"/>
+                </a:solidFill>
+                <a:latin typeface="Tahoma" panose="020B0604030504040204" pitchFamily="34" charset="0"/>
+                <a:ea typeface="Tahoma" panose="020B0604030504040204" pitchFamily="34" charset="0"/>
+                <a:cs typeface="Tahoma" panose="020B0604030504040204" pitchFamily="34" charset="0"/>
+              </a:rPr>
+              <a:t>	each half-byte of lower 9-bytes contains a single decimal digit</a:t>
+            </a:r>
+          </a:p>
+          <a:p>
+            <a:pPr marL="0" indent="0">
+              <a:buNone/>
+            </a:pPr>
+            <a:r>
+              <a:rPr lang="en-US" sz="1400" dirty="0">
+                <a:solidFill>
+                  <a:schemeClr val="tx2"/>
+                </a:solidFill>
+                <a:latin typeface="Tahoma" panose="020B0604030504040204" pitchFamily="34" charset="0"/>
+                <a:ea typeface="Tahoma" panose="020B0604030504040204" pitchFamily="34" charset="0"/>
+                <a:cs typeface="Tahoma" panose="020B0604030504040204" pitchFamily="34" charset="0"/>
+              </a:rPr>
+              <a:t>	the highest bit of the highest byte contains sign-bit 0/1 (+/-)</a:t>
+            </a:r>
+          </a:p>
+          <a:p>
+            <a:pPr marL="0" indent="0">
+              <a:buNone/>
+            </a:pPr>
+            <a:r>
+              <a:rPr lang="en-US" sz="1400" dirty="0">
+                <a:solidFill>
+                  <a:schemeClr val="tx2"/>
+                </a:solidFill>
+                <a:latin typeface="Tahoma" panose="020B0604030504040204" pitchFamily="34" charset="0"/>
+                <a:ea typeface="Tahoma" panose="020B0604030504040204" pitchFamily="34" charset="0"/>
+                <a:cs typeface="Tahoma" panose="020B0604030504040204" pitchFamily="34" charset="0"/>
+              </a:rPr>
+              <a:t>	lower 7-bits of the highest bytes are not used</a:t>
+            </a:r>
+          </a:p>
+          <a:p>
+            <a:pPr marL="0" indent="0">
+              <a:buNone/>
+            </a:pPr>
+            <a:endParaRPr lang="en-US" sz="1400" dirty="0">
+              <a:solidFill>
+                <a:schemeClr val="tx2"/>
+              </a:solidFill>
+              <a:latin typeface="Tahoma" panose="020B0604030504040204" pitchFamily="34" charset="0"/>
+              <a:ea typeface="Tahoma" panose="020B0604030504040204" pitchFamily="34" charset="0"/>
+              <a:cs typeface="Tahoma" panose="020B0604030504040204" pitchFamily="34" charset="0"/>
+            </a:endParaRPr>
+          </a:p>
+          <a:p>
+            <a:pPr marL="0" indent="0">
+              <a:buNone/>
+            </a:pPr>
+            <a:r>
+              <a:rPr lang="en-US" sz="1400" dirty="0">
+                <a:solidFill>
+                  <a:schemeClr val="tx2"/>
+                </a:solidFill>
+                <a:latin typeface="Tahoma" panose="020B0604030504040204" pitchFamily="34" charset="0"/>
+                <a:ea typeface="Tahoma" panose="020B0604030504040204" pitchFamily="34" charset="0"/>
+                <a:cs typeface="Tahoma" panose="020B0604030504040204" pitchFamily="34" charset="0"/>
+              </a:rPr>
+              <a:t>	+999999999999999999 //18-digits, max value</a:t>
+            </a:r>
+          </a:p>
+          <a:p>
+            <a:pPr marL="0" indent="0">
+              <a:buNone/>
+            </a:pPr>
+            <a:r>
+              <a:rPr lang="en-US" sz="1400" dirty="0">
+                <a:solidFill>
+                  <a:schemeClr val="tx2"/>
+                </a:solidFill>
+                <a:latin typeface="Tahoma" panose="020B0604030504040204" pitchFamily="34" charset="0"/>
+                <a:ea typeface="Tahoma" panose="020B0604030504040204" pitchFamily="34" charset="0"/>
+                <a:cs typeface="Tahoma" panose="020B0604030504040204" pitchFamily="34" charset="0"/>
+              </a:rPr>
+              <a:t>	-999999999999999999 //18-digits, min value</a:t>
+            </a:r>
+          </a:p>
+          <a:p>
+            <a:pPr marL="0" indent="0">
+              <a:buNone/>
+            </a:pPr>
+            <a:r>
+              <a:rPr lang="en-US" sz="1400" dirty="0">
+                <a:solidFill>
+                  <a:schemeClr val="tx2"/>
+                </a:solidFill>
+                <a:latin typeface="Tahoma" panose="020B0604030504040204" pitchFamily="34" charset="0"/>
+                <a:ea typeface="Tahoma" panose="020B0604030504040204" pitchFamily="34" charset="0"/>
+                <a:cs typeface="Tahoma" panose="020B0604030504040204" pitchFamily="34" charset="0"/>
+              </a:rPr>
+              <a:t>	</a:t>
+            </a:r>
+          </a:p>
+          <a:p>
+            <a:pPr marL="0" indent="0">
+              <a:buNone/>
+            </a:pPr>
+            <a:r>
+              <a:rPr lang="en-US" sz="1400" dirty="0">
+                <a:solidFill>
+                  <a:schemeClr val="tx2"/>
+                </a:solidFill>
+                <a:latin typeface="Tahoma" panose="020B0604030504040204" pitchFamily="34" charset="0"/>
+                <a:ea typeface="Tahoma" panose="020B0604030504040204" pitchFamily="34" charset="0"/>
+                <a:cs typeface="Tahoma" panose="020B0604030504040204" pitchFamily="34" charset="0"/>
+              </a:rPr>
+              <a:t>I encourage the reader to figure out how BCD can be used in LED-display.</a:t>
+            </a:r>
+          </a:p>
+        </p:txBody>
+      </p:sp>
+    </p:spTree>
+    <p:extLst>
+      <p:ext uri="{BB962C8B-B14F-4D97-AF65-F5344CB8AC3E}">
+        <p14:creationId xmlns:p14="http://schemas.microsoft.com/office/powerpoint/2010/main" val="696853544"/>
+      </p:ext>
+    </p:extLst>
+  </p:cSld>
+  <p:clrMapOvr>
+    <a:masterClrMapping/>
+  </p:clrMapOvr>
+  <mc:AlternateContent xmlns:mc="http://schemas.openxmlformats.org/markup-compatibility/2006" xmlns:p14="http://schemas.microsoft.com/office/powerpoint/2010/main">
+    <mc:Choice Requires="p14">
+      <p:transition spd="slow" p14:dur="1250">
+        <p14:flip dir="r"/>
+      </p:transition>
+    </mc:Choice>
+    <mc:Fallback xmlns="">
+      <p:transition spd="slow">
+        <p:fade/>
+      </p:transition>
+    </mc:Fallback>
+  </mc:AlternateContent>
+</p:sld>
+</file>
+
+<file path=ppt/slides/slide17.xml><?xml version="1.0" encoding="utf-8"?>
+<p:sld xmlns:a="http://schemas.openxmlformats.org/drawingml/2006/main" xmlns:r="http://schemas.openxmlformats.org/officeDocument/2006/relationships" xmlns:p="http://schemas.openxmlformats.org/presentationml/2006/main">
+  <p:cSld>
+    <p:spTree>
+      <p:nvGrpSpPr>
+        <p:cNvPr id="1" name=""/>
+        <p:cNvGrpSpPr/>
+        <p:nvPr/>
+      </p:nvGrpSpPr>
+      <p:grpSpPr>
+        <a:xfrm>
+          <a:off x="0" y="0"/>
+          <a:ext cx="0" cy="0"/>
+          <a:chOff x="0" y="0"/>
+          <a:chExt cx="0" cy="0"/>
+        </a:xfrm>
+      </p:grpSpPr>
+      <p:sp>
+        <p:nvSpPr>
+          <p:cNvPr id="2" name="Title 1">
+            <a:extLst>
+              <a:ext uri="{FF2B5EF4-FFF2-40B4-BE49-F238E27FC236}">
+                <a16:creationId xmlns:a16="http://schemas.microsoft.com/office/drawing/2014/main" id="{C6466A7A-BAA9-4922-81DF-E958EDBA80CF}"/>
+              </a:ext>
+            </a:extLst>
+          </p:cNvPr>
+          <p:cNvSpPr>
+            <a:spLocks noGrp="1"/>
+          </p:cNvSpPr>
+          <p:nvPr>
+            <p:ph type="ctrTitle" idx="4294967295"/>
+          </p:nvPr>
+        </p:nvSpPr>
+        <p:spPr>
+          <a:xfrm>
+            <a:off x="1150215" y="452531"/>
+            <a:ext cx="8361363" cy="552450"/>
+          </a:xfrm>
+        </p:spPr>
+        <p:txBody>
+          <a:bodyPr>
+            <a:normAutofit fontScale="90000"/>
+          </a:bodyPr>
+          <a:lstStyle/>
+          <a:p>
+            <a:r>
+              <a:rPr lang="en-US" sz="4400" dirty="0"/>
+              <a:t>REAL FRIENDS</a:t>
+            </a:r>
+          </a:p>
+        </p:txBody>
+      </p:sp>
+      <p:sp>
+        <p:nvSpPr>
+          <p:cNvPr id="3" name="Subtitle 2">
+            <a:extLst>
+              <a:ext uri="{FF2B5EF4-FFF2-40B4-BE49-F238E27FC236}">
+                <a16:creationId xmlns:a16="http://schemas.microsoft.com/office/drawing/2014/main" id="{E536BDF3-8BC3-4705-A0E0-23EED5878F87}"/>
+              </a:ext>
+            </a:extLst>
+          </p:cNvPr>
+          <p:cNvSpPr>
+            <a:spLocks noGrp="1"/>
+          </p:cNvSpPr>
+          <p:nvPr>
+            <p:ph type="subTitle" idx="4294967295"/>
+          </p:nvPr>
+        </p:nvSpPr>
+        <p:spPr>
+          <a:xfrm>
+            <a:off x="1150300" y="1227138"/>
+            <a:ext cx="9972675" cy="4928002"/>
+          </a:xfrm>
+        </p:spPr>
+        <p:txBody>
+          <a:bodyPr>
+            <a:normAutofit fontScale="92500" lnSpcReduction="20000"/>
+          </a:bodyPr>
+          <a:lstStyle/>
+          <a:p>
+            <a:r>
+              <a:rPr lang="en-US" sz="1400" dirty="0">
+                <a:solidFill>
+                  <a:schemeClr val="tx2"/>
+                </a:solidFill>
+                <a:latin typeface="Tahoma" panose="020B0604030504040204" pitchFamily="34" charset="0"/>
+                <a:ea typeface="Tahoma" panose="020B0604030504040204" pitchFamily="34" charset="0"/>
+                <a:cs typeface="Tahoma" panose="020B0604030504040204" pitchFamily="34" charset="0"/>
+              </a:rPr>
+              <a:t>Single Initializer</a:t>
+            </a:r>
+          </a:p>
+          <a:p>
+            <a:r>
+              <a:rPr lang="en-US" sz="1400" dirty="0">
+                <a:solidFill>
+                  <a:schemeClr val="tx2"/>
+                </a:solidFill>
+                <a:latin typeface="Tahoma" panose="020B0604030504040204" pitchFamily="34" charset="0"/>
+                <a:ea typeface="Tahoma" panose="020B0604030504040204" pitchFamily="34" charset="0"/>
+                <a:cs typeface="Tahoma" panose="020B0604030504040204" pitchFamily="34" charset="0"/>
+              </a:rPr>
+              <a:t>	VAR1 	REAL4  	1.0  //4-BYTE</a:t>
+            </a:r>
+          </a:p>
+          <a:p>
+            <a:r>
+              <a:rPr lang="en-US" sz="1400" dirty="0">
+                <a:solidFill>
+                  <a:schemeClr val="tx2"/>
+                </a:solidFill>
+                <a:latin typeface="Tahoma" panose="020B0604030504040204" pitchFamily="34" charset="0"/>
+                <a:ea typeface="Tahoma" panose="020B0604030504040204" pitchFamily="34" charset="0"/>
+                <a:cs typeface="Tahoma" panose="020B0604030504040204" pitchFamily="34" charset="0"/>
+              </a:rPr>
+              <a:t>	VAR2 	DD  	1.0  //4-BYTE</a:t>
+            </a:r>
+          </a:p>
+          <a:p>
+            <a:r>
+              <a:rPr lang="en-US" sz="1400" dirty="0">
+                <a:solidFill>
+                  <a:schemeClr val="tx2"/>
+                </a:solidFill>
+                <a:latin typeface="Tahoma" panose="020B0604030504040204" pitchFamily="34" charset="0"/>
+                <a:ea typeface="Tahoma" panose="020B0604030504040204" pitchFamily="34" charset="0"/>
+                <a:cs typeface="Tahoma" panose="020B0604030504040204" pitchFamily="34" charset="0"/>
+              </a:rPr>
+              <a:t>	VAR3 	REAL8  	?    //8-BYTE</a:t>
+            </a:r>
+          </a:p>
+          <a:p>
+            <a:r>
+              <a:rPr lang="en-US" sz="1400" dirty="0">
+                <a:solidFill>
+                  <a:schemeClr val="tx2"/>
+                </a:solidFill>
+                <a:latin typeface="Tahoma" panose="020B0604030504040204" pitchFamily="34" charset="0"/>
+                <a:ea typeface="Tahoma" panose="020B0604030504040204" pitchFamily="34" charset="0"/>
+                <a:cs typeface="Tahoma" panose="020B0604030504040204" pitchFamily="34" charset="0"/>
+              </a:rPr>
+              <a:t>	VAR4 	DQ  	?    //8-BYTE</a:t>
+            </a:r>
+          </a:p>
+          <a:p>
+            <a:r>
+              <a:rPr lang="en-US" sz="1400" dirty="0">
+                <a:solidFill>
+                  <a:schemeClr val="tx2"/>
+                </a:solidFill>
+                <a:latin typeface="Tahoma" panose="020B0604030504040204" pitchFamily="34" charset="0"/>
+                <a:ea typeface="Tahoma" panose="020B0604030504040204" pitchFamily="34" charset="0"/>
+                <a:cs typeface="Tahoma" panose="020B0604030504040204" pitchFamily="34" charset="0"/>
+              </a:rPr>
+              <a:t>	VAR5 	REAL10  1.0  //10-BYTE</a:t>
+            </a:r>
+          </a:p>
+          <a:p>
+            <a:r>
+              <a:rPr lang="en-US" sz="1400" dirty="0">
+                <a:solidFill>
+                  <a:schemeClr val="tx2"/>
+                </a:solidFill>
+                <a:latin typeface="Tahoma" panose="020B0604030504040204" pitchFamily="34" charset="0"/>
+                <a:ea typeface="Tahoma" panose="020B0604030504040204" pitchFamily="34" charset="0"/>
+                <a:cs typeface="Tahoma" panose="020B0604030504040204" pitchFamily="34" charset="0"/>
+              </a:rPr>
+              <a:t>	VAR6 	DT  	1.0  //10-BYTE</a:t>
+            </a:r>
+          </a:p>
+          <a:p>
+            <a:endParaRPr lang="en-US" sz="1400" dirty="0">
+              <a:solidFill>
+                <a:schemeClr val="tx2"/>
+              </a:solidFill>
+              <a:latin typeface="Tahoma" panose="020B0604030504040204" pitchFamily="34" charset="0"/>
+              <a:ea typeface="Tahoma" panose="020B0604030504040204" pitchFamily="34" charset="0"/>
+              <a:cs typeface="Tahoma" panose="020B0604030504040204" pitchFamily="34" charset="0"/>
+            </a:endParaRPr>
+          </a:p>
+          <a:p>
+            <a:r>
+              <a:rPr lang="en-US" sz="1400" dirty="0">
+                <a:solidFill>
+                  <a:schemeClr val="tx2"/>
+                </a:solidFill>
+                <a:latin typeface="Tahoma" panose="020B0604030504040204" pitchFamily="34" charset="0"/>
+                <a:ea typeface="Tahoma" panose="020B0604030504040204" pitchFamily="34" charset="0"/>
+                <a:cs typeface="Tahoma" panose="020B0604030504040204" pitchFamily="34" charset="0"/>
+              </a:rPr>
+              <a:t>Multiple Initializers </a:t>
+            </a:r>
+          </a:p>
+          <a:p>
+            <a:r>
+              <a:rPr lang="en-US" sz="1400" dirty="0">
+                <a:solidFill>
+                  <a:schemeClr val="tx2"/>
+                </a:solidFill>
+                <a:latin typeface="Tahoma" panose="020B0604030504040204" pitchFamily="34" charset="0"/>
+                <a:ea typeface="Tahoma" panose="020B0604030504040204" pitchFamily="34" charset="0"/>
+                <a:cs typeface="Tahoma" panose="020B0604030504040204" pitchFamily="34" charset="0"/>
+              </a:rPr>
+              <a:t>	myArray 	REAL4 1.0, 1.1, 1.2  	//1-D Array</a:t>
+            </a:r>
+          </a:p>
+          <a:p>
+            <a:r>
+              <a:rPr lang="en-US" sz="1400" dirty="0">
+                <a:solidFill>
+                  <a:schemeClr val="tx2"/>
+                </a:solidFill>
+                <a:latin typeface="Tahoma" panose="020B0604030504040204" pitchFamily="34" charset="0"/>
+                <a:ea typeface="Tahoma" panose="020B0604030504040204" pitchFamily="34" charset="0"/>
+                <a:cs typeface="Tahoma" panose="020B0604030504040204" pitchFamily="34" charset="0"/>
+              </a:rPr>
+              <a:t>	myMatrix    REAL4 2.0, 2.1, 2.2 	//2-D Matrix</a:t>
+            </a:r>
+          </a:p>
+          <a:p>
+            <a:r>
+              <a:rPr lang="en-US" sz="1400" dirty="0">
+                <a:solidFill>
+                  <a:schemeClr val="tx2"/>
+                </a:solidFill>
+                <a:latin typeface="Tahoma" panose="020B0604030504040204" pitchFamily="34" charset="0"/>
+                <a:ea typeface="Tahoma" panose="020B0604030504040204" pitchFamily="34" charset="0"/>
+                <a:cs typeface="Tahoma" panose="020B0604030504040204" pitchFamily="34" charset="0"/>
+              </a:rPr>
+              <a:t>				REAL8 2.3, 2.4, 2.5</a:t>
+            </a:r>
+          </a:p>
+          <a:p>
+            <a:r>
+              <a:rPr lang="en-US" sz="1400" dirty="0">
+                <a:solidFill>
+                  <a:schemeClr val="tx2"/>
+                </a:solidFill>
+                <a:latin typeface="Tahoma" panose="020B0604030504040204" pitchFamily="34" charset="0"/>
+                <a:ea typeface="Tahoma" panose="020B0604030504040204" pitchFamily="34" charset="0"/>
+                <a:cs typeface="Tahoma" panose="020B0604030504040204" pitchFamily="34" charset="0"/>
+              </a:rPr>
+              <a:t>				REAL10 2.6, 2.7, 2.8</a:t>
+            </a:r>
+          </a:p>
+          <a:p>
+            <a:r>
+              <a:rPr lang="en-US" sz="1400" dirty="0">
+                <a:solidFill>
+                  <a:schemeClr val="tx2"/>
+                </a:solidFill>
+                <a:latin typeface="Tahoma" panose="020B0604030504040204" pitchFamily="34" charset="0"/>
+                <a:ea typeface="Tahoma" panose="020B0604030504040204" pitchFamily="34" charset="0"/>
+                <a:cs typeface="Tahoma" panose="020B0604030504040204" pitchFamily="34" charset="0"/>
+              </a:rPr>
+              <a:t>	myArray2 	REAL4 1.0 DUP (0)  //allocates 10-REAL4 and set all REAL4 to zero</a:t>
+            </a:r>
+          </a:p>
+          <a:p>
+            <a:r>
+              <a:rPr lang="en-US" sz="1400" dirty="0">
+                <a:solidFill>
+                  <a:schemeClr val="tx2"/>
+                </a:solidFill>
+                <a:latin typeface="Tahoma" panose="020B0604030504040204" pitchFamily="34" charset="0"/>
+                <a:ea typeface="Tahoma" panose="020B0604030504040204" pitchFamily="34" charset="0"/>
+                <a:cs typeface="Tahoma" panose="020B0604030504040204" pitchFamily="34" charset="0"/>
+              </a:rPr>
+              <a:t>	myArray3	REAL4 1.0 DUP (?)  //allocates 10-REAL4, un-initialized</a:t>
+            </a:r>
+          </a:p>
+        </p:txBody>
+      </p:sp>
+    </p:spTree>
+    <p:extLst>
+      <p:ext uri="{BB962C8B-B14F-4D97-AF65-F5344CB8AC3E}">
+        <p14:creationId xmlns:p14="http://schemas.microsoft.com/office/powerpoint/2010/main" val="3653461796"/>
+      </p:ext>
+    </p:extLst>
+  </p:cSld>
+  <p:clrMapOvr>
+    <a:masterClrMapping/>
+  </p:clrMapOvr>
+  <mc:AlternateContent xmlns:mc="http://schemas.openxmlformats.org/markup-compatibility/2006" xmlns:p14="http://schemas.microsoft.com/office/powerpoint/2010/main">
+    <mc:Choice Requires="p14">
+      <p:transition spd="slow" p14:dur="1250">
+        <p14:flip dir="r"/>
+      </p:transition>
+    </mc:Choice>
+    <mc:Fallback xmlns="">
+      <p:transition spd="slow">
+        <p:fade/>
+      </p:transition>
+    </mc:Fallback>
+  </mc:AlternateContent>
+</p:sld>
+</file>
+
+<file path=ppt/slides/slide18.xml><?xml version="1.0" encoding="utf-8"?>
+<p:sld xmlns:a="http://schemas.openxmlformats.org/drawingml/2006/main" xmlns:r="http://schemas.openxmlformats.org/officeDocument/2006/relationships" xmlns:p="http://schemas.openxmlformats.org/presentationml/2006/main">
+  <p:cSld>
+    <p:spTree>
+      <p:nvGrpSpPr>
+        <p:cNvPr id="1" name=""/>
+        <p:cNvGrpSpPr/>
+        <p:nvPr/>
+      </p:nvGrpSpPr>
+      <p:grpSpPr>
+        <a:xfrm>
+          <a:off x="0" y="0"/>
+          <a:ext cx="0" cy="0"/>
+          <a:chOff x="0" y="0"/>
+          <a:chExt cx="0" cy="0"/>
+        </a:xfrm>
+      </p:grpSpPr>
+      <p:sp>
+        <p:nvSpPr>
+          <p:cNvPr id="2" name="Title 1">
+            <a:extLst>
+              <a:ext uri="{FF2B5EF4-FFF2-40B4-BE49-F238E27FC236}">
+                <a16:creationId xmlns:a16="http://schemas.microsoft.com/office/drawing/2014/main" id="{C6466A7A-BAA9-4922-81DF-E958EDBA80CF}"/>
+              </a:ext>
+            </a:extLst>
+          </p:cNvPr>
+          <p:cNvSpPr>
+            <a:spLocks noGrp="1"/>
+          </p:cNvSpPr>
+          <p:nvPr>
+            <p:ph type="ctrTitle" idx="4294967295"/>
+          </p:nvPr>
+        </p:nvSpPr>
+        <p:spPr>
+          <a:xfrm>
+            <a:off x="1150215" y="452531"/>
+            <a:ext cx="8361363" cy="552450"/>
+          </a:xfrm>
+        </p:spPr>
+        <p:txBody>
+          <a:bodyPr>
+            <a:normAutofit fontScale="90000"/>
+          </a:bodyPr>
+          <a:lstStyle/>
+          <a:p>
+            <a:r>
+              <a:rPr lang="en-US" sz="4400" dirty="0"/>
+              <a:t>LITTLE-ENDIAN VS BIG-ENDIAN</a:t>
+            </a:r>
+          </a:p>
+        </p:txBody>
+      </p:sp>
+      <p:sp>
+        <p:nvSpPr>
+          <p:cNvPr id="3" name="Subtitle 2">
+            <a:extLst>
+              <a:ext uri="{FF2B5EF4-FFF2-40B4-BE49-F238E27FC236}">
+                <a16:creationId xmlns:a16="http://schemas.microsoft.com/office/drawing/2014/main" id="{E536BDF3-8BC3-4705-A0E0-23EED5878F87}"/>
+              </a:ext>
+            </a:extLst>
+          </p:cNvPr>
+          <p:cNvSpPr>
+            <a:spLocks noGrp="1"/>
+          </p:cNvSpPr>
+          <p:nvPr>
+            <p:ph type="subTitle" idx="4294967295"/>
+          </p:nvPr>
+        </p:nvSpPr>
+        <p:spPr>
+          <a:xfrm>
+            <a:off x="1150300" y="1227138"/>
+            <a:ext cx="9972675" cy="4928002"/>
+          </a:xfrm>
+        </p:spPr>
+        <p:txBody>
+          <a:bodyPr>
+            <a:normAutofit/>
+          </a:bodyPr>
+          <a:lstStyle/>
+          <a:p>
+            <a:pPr marL="635508" lvl="1" indent="-342900">
+              <a:buFont typeface="+mj-lt"/>
+              <a:buAutoNum type="arabicPeriod"/>
+            </a:pPr>
+            <a:r>
+              <a:rPr lang="en-US" sz="1400" dirty="0">
+                <a:solidFill>
+                  <a:schemeClr val="tx2"/>
+                </a:solidFill>
+                <a:latin typeface="Tahoma" panose="020B0604030504040204" pitchFamily="34" charset="0"/>
+                <a:ea typeface="Tahoma" panose="020B0604030504040204" pitchFamily="34" charset="0"/>
+                <a:cs typeface="Tahoma" panose="020B0604030504040204" pitchFamily="34" charset="0"/>
+              </a:rPr>
+              <a:t>CPU STORES/RETRIEVE LEAST SIGNIFICANT BYTE FIRST //LITTLE</a:t>
+            </a:r>
+          </a:p>
+          <a:p>
+            <a:pPr marL="635508" lvl="1" indent="-342900">
+              <a:buFont typeface="+mj-lt"/>
+              <a:buAutoNum type="arabicPeriod"/>
+            </a:pPr>
+            <a:endParaRPr lang="en-US" sz="1400" dirty="0">
+              <a:solidFill>
+                <a:schemeClr val="tx2"/>
+              </a:solidFill>
+              <a:latin typeface="Tahoma" panose="020B0604030504040204" pitchFamily="34" charset="0"/>
+              <a:ea typeface="Tahoma" panose="020B0604030504040204" pitchFamily="34" charset="0"/>
+              <a:cs typeface="Tahoma" panose="020B0604030504040204" pitchFamily="34" charset="0"/>
+            </a:endParaRPr>
+          </a:p>
+          <a:p>
+            <a:pPr marL="635508" lvl="1" indent="-342900">
+              <a:buFont typeface="+mj-lt"/>
+              <a:buAutoNum type="arabicPeriod"/>
+            </a:pPr>
+            <a:r>
+              <a:rPr lang="en-US" sz="1400" dirty="0">
+                <a:solidFill>
+                  <a:schemeClr val="tx2"/>
+                </a:solidFill>
+                <a:latin typeface="Tahoma" panose="020B0604030504040204" pitchFamily="34" charset="0"/>
+                <a:ea typeface="Tahoma" panose="020B0604030504040204" pitchFamily="34" charset="0"/>
+                <a:cs typeface="Tahoma" panose="020B0604030504040204" pitchFamily="34" charset="0"/>
+              </a:rPr>
+              <a:t>CPU STORES /RETRIEVE THE MOST SIGNIFICANT BYTE FIRST //BIG</a:t>
+            </a:r>
+          </a:p>
+          <a:p>
+            <a:pPr marL="635508" lvl="1" indent="-342900">
+              <a:buFont typeface="+mj-lt"/>
+              <a:buAutoNum type="arabicPeriod"/>
+            </a:pPr>
+            <a:endParaRPr lang="en-US" sz="1200" dirty="0">
+              <a:solidFill>
+                <a:schemeClr val="tx2"/>
+              </a:solidFill>
+              <a:latin typeface="Tahoma" panose="020B0604030504040204" pitchFamily="34" charset="0"/>
+              <a:ea typeface="Tahoma" panose="020B0604030504040204" pitchFamily="34" charset="0"/>
+              <a:cs typeface="Tahoma" panose="020B0604030504040204" pitchFamily="34" charset="0"/>
+            </a:endParaRPr>
+          </a:p>
+          <a:p>
+            <a:pPr marL="292608" lvl="1" indent="0">
+              <a:buNone/>
+            </a:pPr>
+            <a:endParaRPr lang="en-US" sz="1200" dirty="0">
+              <a:solidFill>
+                <a:schemeClr val="tx2"/>
+              </a:solidFill>
+              <a:latin typeface="Tahoma" panose="020B0604030504040204" pitchFamily="34" charset="0"/>
+              <a:ea typeface="Tahoma" panose="020B0604030504040204" pitchFamily="34" charset="0"/>
+              <a:cs typeface="Tahoma" panose="020B0604030504040204" pitchFamily="34" charset="0"/>
+            </a:endParaRPr>
+          </a:p>
+        </p:txBody>
+      </p:sp>
+      <p:pic>
+        <p:nvPicPr>
+          <p:cNvPr id="6" name="Picture 5">
+            <a:extLst>
+              <a:ext uri="{FF2B5EF4-FFF2-40B4-BE49-F238E27FC236}">
+                <a16:creationId xmlns:a16="http://schemas.microsoft.com/office/drawing/2014/main" id="{1E6627E3-E562-4022-BE66-350030CE067E}"/>
+              </a:ext>
+            </a:extLst>
+          </p:cNvPr>
+          <p:cNvPicPr>
+            <a:picLocks noChangeAspect="1"/>
+          </p:cNvPicPr>
+          <p:nvPr/>
+        </p:nvPicPr>
+        <p:blipFill>
+          <a:blip r:embed="rId2"/>
+          <a:stretch>
+            <a:fillRect/>
+          </a:stretch>
+        </p:blipFill>
+        <p:spPr>
+          <a:xfrm>
+            <a:off x="1450466" y="2459439"/>
+            <a:ext cx="6782937" cy="2724836"/>
+          </a:xfrm>
+          <a:prstGeom prst="rect">
+            <a:avLst/>
+          </a:prstGeom>
+        </p:spPr>
+      </p:pic>
+    </p:spTree>
+    <p:extLst>
+      <p:ext uri="{BB962C8B-B14F-4D97-AF65-F5344CB8AC3E}">
+        <p14:creationId xmlns:p14="http://schemas.microsoft.com/office/powerpoint/2010/main" val="2016962895"/>
+      </p:ext>
+    </p:extLst>
+  </p:cSld>
+  <p:clrMapOvr>
+    <a:masterClrMapping/>
+  </p:clrMapOvr>
+  <mc:AlternateContent xmlns:mc="http://schemas.openxmlformats.org/markup-compatibility/2006" xmlns:p14="http://schemas.microsoft.com/office/powerpoint/2010/main">
+    <mc:Choice Requires="p14">
+      <p:transition spd="slow" p14:dur="1250">
+        <p14:flip dir="r"/>
+      </p:transition>
+    </mc:Choice>
+    <mc:Fallback xmlns="">
+      <p:transition spd="slow">
+        <p:fade/>
+      </p:transition>
+    </mc:Fallback>
+  </mc:AlternateContent>
+</p:sld>
+</file>
+
+<file path=ppt/slides/slide19.xml><?xml version="1.0" encoding="utf-8"?>
+<p:sld xmlns:a="http://schemas.openxmlformats.org/drawingml/2006/main" xmlns:r="http://schemas.openxmlformats.org/officeDocument/2006/relationships" xmlns:p="http://schemas.openxmlformats.org/presentationml/2006/main">
+  <p:cSld>
+    <p:spTree>
+      <p:nvGrpSpPr>
+        <p:cNvPr id="1" name=""/>
+        <p:cNvGrpSpPr/>
+        <p:nvPr/>
+      </p:nvGrpSpPr>
+      <p:grpSpPr>
+        <a:xfrm>
+          <a:off x="0" y="0"/>
+          <a:ext cx="0" cy="0"/>
+          <a:chOff x="0" y="0"/>
+          <a:chExt cx="0" cy="0"/>
+        </a:xfrm>
+      </p:grpSpPr>
+      <p:sp>
+        <p:nvSpPr>
+          <p:cNvPr id="2" name="Title 1">
+            <a:extLst>
+              <a:ext uri="{FF2B5EF4-FFF2-40B4-BE49-F238E27FC236}">
+                <a16:creationId xmlns:a16="http://schemas.microsoft.com/office/drawing/2014/main" id="{C6466A7A-BAA9-4922-81DF-E958EDBA80CF}"/>
+              </a:ext>
+            </a:extLst>
+          </p:cNvPr>
+          <p:cNvSpPr>
+            <a:spLocks noGrp="1"/>
+          </p:cNvSpPr>
+          <p:nvPr>
+            <p:ph type="ctrTitle" idx="4294967295"/>
+          </p:nvPr>
+        </p:nvSpPr>
+        <p:spPr>
+          <a:xfrm>
+            <a:off x="1150215" y="452531"/>
+            <a:ext cx="8361363" cy="552450"/>
+          </a:xfrm>
+        </p:spPr>
+        <p:txBody>
+          <a:bodyPr>
+            <a:normAutofit fontScale="90000"/>
+          </a:bodyPr>
+          <a:lstStyle/>
+          <a:p>
+            <a:r>
+              <a:rPr lang="en-US" sz="4400" dirty="0"/>
+              <a:t>SYMBOLIC CONSTANTS</a:t>
+            </a:r>
+          </a:p>
+        </p:txBody>
+      </p:sp>
+      <p:sp>
+        <p:nvSpPr>
+          <p:cNvPr id="3" name="Subtitle 2">
+            <a:extLst>
+              <a:ext uri="{FF2B5EF4-FFF2-40B4-BE49-F238E27FC236}">
+                <a16:creationId xmlns:a16="http://schemas.microsoft.com/office/drawing/2014/main" id="{E536BDF3-8BC3-4705-A0E0-23EED5878F87}"/>
+              </a:ext>
+            </a:extLst>
+          </p:cNvPr>
+          <p:cNvSpPr>
+            <a:spLocks noGrp="1"/>
+          </p:cNvSpPr>
+          <p:nvPr>
+            <p:ph type="subTitle" idx="4294967295"/>
+          </p:nvPr>
+        </p:nvSpPr>
+        <p:spPr>
+          <a:xfrm>
+            <a:off x="1150300" y="1227138"/>
+            <a:ext cx="9972675" cy="4928002"/>
+          </a:xfrm>
+        </p:spPr>
+        <p:txBody>
+          <a:bodyPr>
+            <a:normAutofit/>
+          </a:bodyPr>
+          <a:lstStyle/>
+          <a:p>
+            <a:r>
+              <a:rPr lang="en-US" sz="1400" dirty="0">
+                <a:solidFill>
+                  <a:schemeClr val="tx2"/>
+                </a:solidFill>
+                <a:latin typeface="Tahoma" panose="020B0604030504040204" pitchFamily="34" charset="0"/>
+                <a:ea typeface="Tahoma" panose="020B0604030504040204" pitchFamily="34" charset="0"/>
+                <a:cs typeface="Tahoma" panose="020B0604030504040204" pitchFamily="34" charset="0"/>
+              </a:rPr>
+              <a:t>They are associating an identifier with an integer, text, etc.</a:t>
+            </a:r>
+          </a:p>
+          <a:p>
+            <a:r>
+              <a:rPr lang="en-US" sz="1400" dirty="0">
+                <a:solidFill>
+                  <a:schemeClr val="tx2"/>
+                </a:solidFill>
+                <a:latin typeface="Tahoma" panose="020B0604030504040204" pitchFamily="34" charset="0"/>
+                <a:ea typeface="Tahoma" panose="020B0604030504040204" pitchFamily="34" charset="0"/>
+                <a:cs typeface="Tahoma" panose="020B0604030504040204" pitchFamily="34" charset="0"/>
+              </a:rPr>
+              <a:t>e.g.</a:t>
+            </a:r>
+          </a:p>
+          <a:p>
+            <a:r>
+              <a:rPr lang="en-US" sz="1400" dirty="0" err="1">
+                <a:solidFill>
+                  <a:schemeClr val="tx2"/>
+                </a:solidFill>
+                <a:latin typeface="Tahoma" panose="020B0604030504040204" pitchFamily="34" charset="0"/>
+                <a:ea typeface="Tahoma" panose="020B0604030504040204" pitchFamily="34" charset="0"/>
+                <a:cs typeface="Tahoma" panose="020B0604030504040204" pitchFamily="34" charset="0"/>
+              </a:rPr>
+              <a:t>mov</a:t>
+            </a:r>
+            <a:r>
+              <a:rPr lang="en-US" sz="1400" dirty="0">
+                <a:solidFill>
+                  <a:schemeClr val="tx2"/>
+                </a:solidFill>
+                <a:latin typeface="Tahoma" panose="020B0604030504040204" pitchFamily="34" charset="0"/>
+                <a:ea typeface="Tahoma" panose="020B0604030504040204" pitchFamily="34" charset="0"/>
+                <a:cs typeface="Tahoma" panose="020B0604030504040204" pitchFamily="34" charset="0"/>
+              </a:rPr>
+              <a:t> eax, 10 //no symbolic constant</a:t>
+            </a:r>
+          </a:p>
+          <a:p>
+            <a:endParaRPr lang="en-US" sz="1400" dirty="0">
+              <a:solidFill>
+                <a:schemeClr val="tx2"/>
+              </a:solidFill>
+              <a:latin typeface="Tahoma" panose="020B0604030504040204" pitchFamily="34" charset="0"/>
+              <a:ea typeface="Tahoma" panose="020B0604030504040204" pitchFamily="34" charset="0"/>
+              <a:cs typeface="Tahoma" panose="020B0604030504040204" pitchFamily="34" charset="0"/>
+            </a:endParaRPr>
+          </a:p>
+          <a:p>
+            <a:r>
+              <a:rPr lang="en-US" sz="1400" dirty="0" err="1">
+                <a:solidFill>
+                  <a:schemeClr val="tx2"/>
+                </a:solidFill>
+                <a:latin typeface="Tahoma" panose="020B0604030504040204" pitchFamily="34" charset="0"/>
+                <a:ea typeface="Tahoma" panose="020B0604030504040204" pitchFamily="34" charset="0"/>
+                <a:cs typeface="Tahoma" panose="020B0604030504040204" pitchFamily="34" charset="0"/>
+              </a:rPr>
+              <a:t>tmp</a:t>
+            </a:r>
+            <a:r>
+              <a:rPr lang="en-US" sz="1400" dirty="0">
+                <a:solidFill>
+                  <a:schemeClr val="tx2"/>
+                </a:solidFill>
+                <a:latin typeface="Tahoma" panose="020B0604030504040204" pitchFamily="34" charset="0"/>
+                <a:ea typeface="Tahoma" panose="020B0604030504040204" pitchFamily="34" charset="0"/>
+                <a:cs typeface="Tahoma" panose="020B0604030504040204" pitchFamily="34" charset="0"/>
+              </a:rPr>
+              <a:t> = 10</a:t>
+            </a:r>
+          </a:p>
+          <a:p>
+            <a:r>
+              <a:rPr lang="en-US" sz="1400" dirty="0" err="1">
+                <a:solidFill>
+                  <a:schemeClr val="tx2"/>
+                </a:solidFill>
+                <a:latin typeface="Tahoma" panose="020B0604030504040204" pitchFamily="34" charset="0"/>
+                <a:ea typeface="Tahoma" panose="020B0604030504040204" pitchFamily="34" charset="0"/>
+                <a:cs typeface="Tahoma" panose="020B0604030504040204" pitchFamily="34" charset="0"/>
+              </a:rPr>
+              <a:t>mov</a:t>
+            </a:r>
+            <a:r>
+              <a:rPr lang="en-US" sz="1400" dirty="0">
+                <a:solidFill>
+                  <a:schemeClr val="tx2"/>
+                </a:solidFill>
+                <a:latin typeface="Tahoma" panose="020B0604030504040204" pitchFamily="34" charset="0"/>
+                <a:ea typeface="Tahoma" panose="020B0604030504040204" pitchFamily="34" charset="0"/>
+                <a:cs typeface="Tahoma" panose="020B0604030504040204" pitchFamily="34" charset="0"/>
+              </a:rPr>
+              <a:t> eax, </a:t>
+            </a:r>
+            <a:r>
+              <a:rPr lang="en-US" sz="1400" dirty="0" err="1">
+                <a:solidFill>
+                  <a:schemeClr val="tx2"/>
+                </a:solidFill>
+                <a:latin typeface="Tahoma" panose="020B0604030504040204" pitchFamily="34" charset="0"/>
+                <a:ea typeface="Tahoma" panose="020B0604030504040204" pitchFamily="34" charset="0"/>
+                <a:cs typeface="Tahoma" panose="020B0604030504040204" pitchFamily="34" charset="0"/>
+              </a:rPr>
+              <a:t>tmp</a:t>
+            </a:r>
+            <a:r>
+              <a:rPr lang="en-US" sz="1400" dirty="0">
+                <a:solidFill>
+                  <a:schemeClr val="tx2"/>
+                </a:solidFill>
+                <a:latin typeface="Tahoma" panose="020B0604030504040204" pitchFamily="34" charset="0"/>
+                <a:ea typeface="Tahoma" panose="020B0604030504040204" pitchFamily="34" charset="0"/>
+                <a:cs typeface="Tahoma" panose="020B0604030504040204" pitchFamily="34" charset="0"/>
+              </a:rPr>
+              <a:t> //using symbolic constant</a:t>
+            </a:r>
+          </a:p>
+          <a:p>
+            <a:endParaRPr lang="en-US" sz="1400" dirty="0">
+              <a:solidFill>
+                <a:schemeClr val="tx2"/>
+              </a:solidFill>
+              <a:latin typeface="Tahoma" panose="020B0604030504040204" pitchFamily="34" charset="0"/>
+              <a:ea typeface="Tahoma" panose="020B0604030504040204" pitchFamily="34" charset="0"/>
+              <a:cs typeface="Tahoma" panose="020B0604030504040204" pitchFamily="34" charset="0"/>
+            </a:endParaRPr>
+          </a:p>
+          <a:p>
+            <a:r>
+              <a:rPr lang="en-US" sz="1400" dirty="0">
+                <a:solidFill>
+                  <a:schemeClr val="tx2"/>
+                </a:solidFill>
+                <a:latin typeface="Tahoma" panose="020B0604030504040204" pitchFamily="34" charset="0"/>
+                <a:ea typeface="Tahoma" panose="020B0604030504040204" pitchFamily="34" charset="0"/>
+                <a:cs typeface="Tahoma" panose="020B0604030504040204" pitchFamily="34" charset="0"/>
+              </a:rPr>
+              <a:t>Symbolic constants allows more maintainable programs, like storing value of PI = 3.14 </a:t>
+            </a:r>
+          </a:p>
+          <a:p>
+            <a:endParaRPr lang="en-US" sz="1400" dirty="0">
+              <a:solidFill>
+                <a:schemeClr val="tx2"/>
+              </a:solidFill>
+              <a:latin typeface="Tahoma" panose="020B0604030504040204" pitchFamily="34" charset="0"/>
+              <a:ea typeface="Tahoma" panose="020B0604030504040204" pitchFamily="34" charset="0"/>
+              <a:cs typeface="Tahoma" panose="020B0604030504040204" pitchFamily="34" charset="0"/>
+            </a:endParaRPr>
+          </a:p>
+        </p:txBody>
+      </p:sp>
+    </p:spTree>
+    <p:extLst>
+      <p:ext uri="{BB962C8B-B14F-4D97-AF65-F5344CB8AC3E}">
+        <p14:creationId xmlns:p14="http://schemas.microsoft.com/office/powerpoint/2010/main" val="3275742967"/>
       </p:ext>
     </p:extLst>
   </p:cSld>
@@ -11402,6 +13561,560 @@
     <p:extLst>
       <p:ext uri="{BB962C8B-B14F-4D97-AF65-F5344CB8AC3E}">
         <p14:creationId xmlns:p14="http://schemas.microsoft.com/office/powerpoint/2010/main" val="2682126602"/>
+      </p:ext>
+    </p:extLst>
+  </p:cSld>
+  <p:clrMapOvr>
+    <a:masterClrMapping/>
+  </p:clrMapOvr>
+  <mc:AlternateContent xmlns:mc="http://schemas.openxmlformats.org/markup-compatibility/2006" xmlns:p14="http://schemas.microsoft.com/office/powerpoint/2010/main">
+    <mc:Choice Requires="p14">
+      <p:transition spd="slow" p14:dur="1250">
+        <p14:flip dir="r"/>
+      </p:transition>
+    </mc:Choice>
+    <mc:Fallback xmlns="">
+      <p:transition spd="slow">
+        <p:fade/>
+      </p:transition>
+    </mc:Fallback>
+  </mc:AlternateContent>
+</p:sld>
+</file>
+
+<file path=ppt/slides/slide20.xml><?xml version="1.0" encoding="utf-8"?>
+<p:sld xmlns:a="http://schemas.openxmlformats.org/drawingml/2006/main" xmlns:r="http://schemas.openxmlformats.org/officeDocument/2006/relationships" xmlns:p="http://schemas.openxmlformats.org/presentationml/2006/main">
+  <p:cSld>
+    <p:spTree>
+      <p:nvGrpSpPr>
+        <p:cNvPr id="1" name=""/>
+        <p:cNvGrpSpPr/>
+        <p:nvPr/>
+      </p:nvGrpSpPr>
+      <p:grpSpPr>
+        <a:xfrm>
+          <a:off x="0" y="0"/>
+          <a:ext cx="0" cy="0"/>
+          <a:chOff x="0" y="0"/>
+          <a:chExt cx="0" cy="0"/>
+        </a:xfrm>
+      </p:grpSpPr>
+      <p:sp>
+        <p:nvSpPr>
+          <p:cNvPr id="2" name="Title 1">
+            <a:extLst>
+              <a:ext uri="{FF2B5EF4-FFF2-40B4-BE49-F238E27FC236}">
+                <a16:creationId xmlns:a16="http://schemas.microsoft.com/office/drawing/2014/main" id="{C6466A7A-BAA9-4922-81DF-E958EDBA80CF}"/>
+              </a:ext>
+            </a:extLst>
+          </p:cNvPr>
+          <p:cNvSpPr>
+            <a:spLocks noGrp="1"/>
+          </p:cNvSpPr>
+          <p:nvPr>
+            <p:ph type="ctrTitle" idx="4294967295"/>
+          </p:nvPr>
+        </p:nvSpPr>
+        <p:spPr>
+          <a:xfrm>
+            <a:off x="1150215" y="452531"/>
+            <a:ext cx="8361363" cy="552450"/>
+          </a:xfrm>
+        </p:spPr>
+        <p:txBody>
+          <a:bodyPr>
+            <a:normAutofit fontScale="90000"/>
+          </a:bodyPr>
+          <a:lstStyle/>
+          <a:p>
+            <a:r>
+              <a:rPr lang="en-US" sz="4400" dirty="0"/>
+              <a:t>CONT.</a:t>
+            </a:r>
+          </a:p>
+        </p:txBody>
+      </p:sp>
+      <p:sp>
+        <p:nvSpPr>
+          <p:cNvPr id="3" name="Subtitle 2">
+            <a:extLst>
+              <a:ext uri="{FF2B5EF4-FFF2-40B4-BE49-F238E27FC236}">
+                <a16:creationId xmlns:a16="http://schemas.microsoft.com/office/drawing/2014/main" id="{E536BDF3-8BC3-4705-A0E0-23EED5878F87}"/>
+              </a:ext>
+            </a:extLst>
+          </p:cNvPr>
+          <p:cNvSpPr>
+            <a:spLocks noGrp="1"/>
+          </p:cNvSpPr>
+          <p:nvPr>
+            <p:ph type="subTitle" idx="4294967295"/>
+          </p:nvPr>
+        </p:nvSpPr>
+        <p:spPr>
+          <a:xfrm>
+            <a:off x="1150300" y="1227138"/>
+            <a:ext cx="9972675" cy="4928002"/>
+          </a:xfrm>
+        </p:spPr>
+        <p:txBody>
+          <a:bodyPr>
+            <a:normAutofit fontScale="85000" lnSpcReduction="20000"/>
+          </a:bodyPr>
+          <a:lstStyle/>
+          <a:p>
+            <a:r>
+              <a:rPr lang="en-US" sz="1400" dirty="0">
+                <a:solidFill>
+                  <a:schemeClr val="tx2"/>
+                </a:solidFill>
+                <a:latin typeface="Tahoma" panose="020B0604030504040204" pitchFamily="34" charset="0"/>
+                <a:ea typeface="Tahoma" panose="020B0604030504040204" pitchFamily="34" charset="0"/>
+                <a:cs typeface="Tahoma" panose="020B0604030504040204" pitchFamily="34" charset="0"/>
+              </a:rPr>
+              <a:t>Using Assembler defined Symbolic constants: $, EQU and TEXTEQU</a:t>
+            </a:r>
+          </a:p>
+          <a:p>
+            <a:endParaRPr lang="en-US" sz="1400" dirty="0">
+              <a:solidFill>
+                <a:schemeClr val="tx2"/>
+              </a:solidFill>
+              <a:latin typeface="Tahoma" panose="020B0604030504040204" pitchFamily="34" charset="0"/>
+              <a:ea typeface="Tahoma" panose="020B0604030504040204" pitchFamily="34" charset="0"/>
+              <a:cs typeface="Tahoma" panose="020B0604030504040204" pitchFamily="34" charset="0"/>
+            </a:endParaRPr>
+          </a:p>
+          <a:p>
+            <a:r>
+              <a:rPr lang="en-US" sz="1400" dirty="0">
+                <a:solidFill>
+                  <a:schemeClr val="tx2"/>
+                </a:solidFill>
+                <a:latin typeface="Tahoma" panose="020B0604030504040204" pitchFamily="34" charset="0"/>
+                <a:ea typeface="Tahoma" panose="020B0604030504040204" pitchFamily="34" charset="0"/>
+                <a:cs typeface="Tahoma" panose="020B0604030504040204" pitchFamily="34" charset="0"/>
+              </a:rPr>
+              <a:t>Finding string length</a:t>
+            </a:r>
+          </a:p>
+          <a:p>
+            <a:r>
+              <a:rPr lang="en-US" sz="1400" dirty="0" err="1">
+                <a:solidFill>
+                  <a:schemeClr val="tx2"/>
+                </a:solidFill>
+                <a:latin typeface="Tahoma" panose="020B0604030504040204" pitchFamily="34" charset="0"/>
+                <a:ea typeface="Tahoma" panose="020B0604030504040204" pitchFamily="34" charset="0"/>
+                <a:cs typeface="Tahoma" panose="020B0604030504040204" pitchFamily="34" charset="0"/>
+              </a:rPr>
+              <a:t>tmp</a:t>
+            </a:r>
+            <a:r>
+              <a:rPr lang="en-US" sz="1400" dirty="0">
+                <a:solidFill>
+                  <a:schemeClr val="tx2"/>
+                </a:solidFill>
+                <a:latin typeface="Tahoma" panose="020B0604030504040204" pitchFamily="34" charset="0"/>
+                <a:ea typeface="Tahoma" panose="020B0604030504040204" pitchFamily="34" charset="0"/>
+                <a:cs typeface="Tahoma" panose="020B0604030504040204" pitchFamily="34" charset="0"/>
+              </a:rPr>
+              <a:t> = "Hello-world"</a:t>
+            </a:r>
+          </a:p>
+          <a:p>
+            <a:r>
+              <a:rPr lang="en-US" sz="1400" dirty="0" err="1">
+                <a:solidFill>
+                  <a:schemeClr val="tx2"/>
+                </a:solidFill>
+                <a:latin typeface="Tahoma" panose="020B0604030504040204" pitchFamily="34" charset="0"/>
+                <a:ea typeface="Tahoma" panose="020B0604030504040204" pitchFamily="34" charset="0"/>
+                <a:cs typeface="Tahoma" panose="020B0604030504040204" pitchFamily="34" charset="0"/>
+              </a:rPr>
+              <a:t>tmpLen</a:t>
+            </a:r>
+            <a:r>
+              <a:rPr lang="en-US" sz="1400" dirty="0">
+                <a:solidFill>
+                  <a:schemeClr val="tx2"/>
+                </a:solidFill>
+                <a:latin typeface="Tahoma" panose="020B0604030504040204" pitchFamily="34" charset="0"/>
+                <a:ea typeface="Tahoma" panose="020B0604030504040204" pitchFamily="34" charset="0"/>
+                <a:cs typeface="Tahoma" panose="020B0604030504040204" pitchFamily="34" charset="0"/>
+              </a:rPr>
+              <a:t> = (</a:t>
+            </a:r>
+            <a:r>
+              <a:rPr lang="en-US" sz="1400" b="1" dirty="0">
+                <a:solidFill>
+                  <a:schemeClr val="tx2"/>
+                </a:solidFill>
+                <a:latin typeface="Tahoma" panose="020B0604030504040204" pitchFamily="34" charset="0"/>
+                <a:ea typeface="Tahoma" panose="020B0604030504040204" pitchFamily="34" charset="0"/>
+                <a:cs typeface="Tahoma" panose="020B0604030504040204" pitchFamily="34" charset="0"/>
+              </a:rPr>
+              <a:t>$</a:t>
+            </a:r>
+            <a:r>
+              <a:rPr lang="en-US" sz="1400" dirty="0">
+                <a:solidFill>
+                  <a:schemeClr val="tx2"/>
+                </a:solidFill>
+                <a:latin typeface="Tahoma" panose="020B0604030504040204" pitchFamily="34" charset="0"/>
+                <a:ea typeface="Tahoma" panose="020B0604030504040204" pitchFamily="34" charset="0"/>
+                <a:cs typeface="Tahoma" panose="020B0604030504040204" pitchFamily="34" charset="0"/>
+              </a:rPr>
+              <a:t> - </a:t>
+            </a:r>
+            <a:r>
+              <a:rPr lang="en-US" sz="1400" dirty="0" err="1">
+                <a:solidFill>
+                  <a:schemeClr val="tx2"/>
+                </a:solidFill>
+                <a:latin typeface="Tahoma" panose="020B0604030504040204" pitchFamily="34" charset="0"/>
+                <a:ea typeface="Tahoma" panose="020B0604030504040204" pitchFamily="34" charset="0"/>
+                <a:cs typeface="Tahoma" panose="020B0604030504040204" pitchFamily="34" charset="0"/>
+              </a:rPr>
+              <a:t>tmp</a:t>
+            </a:r>
+            <a:r>
+              <a:rPr lang="en-US" sz="1400" dirty="0">
+                <a:solidFill>
+                  <a:schemeClr val="tx2"/>
+                </a:solidFill>
+                <a:latin typeface="Tahoma" panose="020B0604030504040204" pitchFamily="34" charset="0"/>
+                <a:ea typeface="Tahoma" panose="020B0604030504040204" pitchFamily="34" charset="0"/>
+                <a:cs typeface="Tahoma" panose="020B0604030504040204" pitchFamily="34" charset="0"/>
+              </a:rPr>
+              <a:t>)</a:t>
+            </a:r>
+          </a:p>
+          <a:p>
+            <a:endParaRPr lang="en-US" sz="1400" dirty="0">
+              <a:solidFill>
+                <a:schemeClr val="tx2"/>
+              </a:solidFill>
+              <a:latin typeface="Tahoma" panose="020B0604030504040204" pitchFamily="34" charset="0"/>
+              <a:ea typeface="Tahoma" panose="020B0604030504040204" pitchFamily="34" charset="0"/>
+              <a:cs typeface="Tahoma" panose="020B0604030504040204" pitchFamily="34" charset="0"/>
+            </a:endParaRPr>
+          </a:p>
+          <a:p>
+            <a:r>
+              <a:rPr lang="en-US" sz="1400" dirty="0">
+                <a:solidFill>
+                  <a:schemeClr val="tx2"/>
+                </a:solidFill>
+                <a:latin typeface="Tahoma" panose="020B0604030504040204" pitchFamily="34" charset="0"/>
+                <a:ea typeface="Tahoma" panose="020B0604030504040204" pitchFamily="34" charset="0"/>
+                <a:cs typeface="Tahoma" panose="020B0604030504040204" pitchFamily="34" charset="0"/>
+              </a:rPr>
+              <a:t>Defining symbols as constants throughout the program //no re-definition allowed</a:t>
+            </a:r>
+          </a:p>
+          <a:p>
+            <a:r>
+              <a:rPr lang="en-US" sz="1400" b="1" dirty="0">
+                <a:solidFill>
+                  <a:schemeClr val="tx2"/>
+                </a:solidFill>
+                <a:latin typeface="Tahoma" panose="020B0604030504040204" pitchFamily="34" charset="0"/>
+                <a:ea typeface="Tahoma" panose="020B0604030504040204" pitchFamily="34" charset="0"/>
+                <a:cs typeface="Tahoma" panose="020B0604030504040204" pitchFamily="34" charset="0"/>
+              </a:rPr>
+              <a:t>PI EQU &lt;3.14&gt;</a:t>
+            </a:r>
+          </a:p>
+          <a:p>
+            <a:endParaRPr lang="en-US" sz="1400" dirty="0">
+              <a:solidFill>
+                <a:schemeClr val="tx2"/>
+              </a:solidFill>
+              <a:latin typeface="Tahoma" panose="020B0604030504040204" pitchFamily="34" charset="0"/>
+              <a:ea typeface="Tahoma" panose="020B0604030504040204" pitchFamily="34" charset="0"/>
+              <a:cs typeface="Tahoma" panose="020B0604030504040204" pitchFamily="34" charset="0"/>
+            </a:endParaRPr>
+          </a:p>
+          <a:p>
+            <a:r>
+              <a:rPr lang="en-US" sz="1400" dirty="0">
+                <a:solidFill>
+                  <a:schemeClr val="tx2"/>
+                </a:solidFill>
+                <a:latin typeface="Tahoma" panose="020B0604030504040204" pitchFamily="34" charset="0"/>
+                <a:ea typeface="Tahoma" panose="020B0604030504040204" pitchFamily="34" charset="0"/>
+                <a:cs typeface="Tahoma" panose="020B0604030504040204" pitchFamily="34" charset="0"/>
+              </a:rPr>
+              <a:t>Creating </a:t>
+            </a:r>
+            <a:r>
+              <a:rPr lang="en-US" sz="1400" dirty="0" err="1">
+                <a:solidFill>
+                  <a:schemeClr val="tx2"/>
+                </a:solidFill>
+                <a:latin typeface="Tahoma" panose="020B0604030504040204" pitchFamily="34" charset="0"/>
+                <a:ea typeface="Tahoma" panose="020B0604030504040204" pitchFamily="34" charset="0"/>
+                <a:cs typeface="Tahoma" panose="020B0604030504040204" pitchFamily="34" charset="0"/>
+              </a:rPr>
+              <a:t>textmacro</a:t>
+            </a:r>
+            <a:r>
+              <a:rPr lang="en-US" sz="1400" dirty="0">
+                <a:solidFill>
+                  <a:schemeClr val="tx2"/>
+                </a:solidFill>
+                <a:latin typeface="Tahoma" panose="020B0604030504040204" pitchFamily="34" charset="0"/>
+                <a:ea typeface="Tahoma" panose="020B0604030504040204" pitchFamily="34" charset="0"/>
+                <a:cs typeface="Tahoma" panose="020B0604030504040204" pitchFamily="34" charset="0"/>
+              </a:rPr>
+              <a:t> //tiny code-chunks</a:t>
+            </a:r>
+          </a:p>
+          <a:p>
+            <a:r>
+              <a:rPr lang="en-US" sz="1400" b="1" dirty="0" err="1">
+                <a:solidFill>
+                  <a:schemeClr val="tx2"/>
+                </a:solidFill>
+                <a:latin typeface="Tahoma" panose="020B0604030504040204" pitchFamily="34" charset="0"/>
+                <a:ea typeface="Tahoma" panose="020B0604030504040204" pitchFamily="34" charset="0"/>
+                <a:cs typeface="Tahoma" panose="020B0604030504040204" pitchFamily="34" charset="0"/>
+              </a:rPr>
+              <a:t>addTenEAX</a:t>
+            </a:r>
+            <a:r>
+              <a:rPr lang="en-US" sz="1400" b="1" dirty="0">
+                <a:solidFill>
+                  <a:schemeClr val="tx2"/>
+                </a:solidFill>
+                <a:latin typeface="Tahoma" panose="020B0604030504040204" pitchFamily="34" charset="0"/>
+                <a:ea typeface="Tahoma" panose="020B0604030504040204" pitchFamily="34" charset="0"/>
+                <a:cs typeface="Tahoma" panose="020B0604030504040204" pitchFamily="34" charset="0"/>
+              </a:rPr>
+              <a:t> TEXTEQU &lt;add eax, 10&gt;</a:t>
+            </a:r>
+          </a:p>
+          <a:p>
+            <a:r>
+              <a:rPr lang="en-US" sz="1400" dirty="0">
+                <a:solidFill>
+                  <a:schemeClr val="tx2"/>
+                </a:solidFill>
+                <a:latin typeface="Tahoma" panose="020B0604030504040204" pitchFamily="34" charset="0"/>
+                <a:ea typeface="Tahoma" panose="020B0604030504040204" pitchFamily="34" charset="0"/>
+                <a:cs typeface="Tahoma" panose="020B0604030504040204" pitchFamily="34" charset="0"/>
+              </a:rPr>
+              <a:t>Both these .code segments are same</a:t>
+            </a:r>
+          </a:p>
+          <a:p>
+            <a:r>
+              <a:rPr lang="en-US" sz="1400" dirty="0">
+                <a:solidFill>
+                  <a:schemeClr val="tx2"/>
+                </a:solidFill>
+                <a:latin typeface="Tahoma" panose="020B0604030504040204" pitchFamily="34" charset="0"/>
+                <a:ea typeface="Tahoma" panose="020B0604030504040204" pitchFamily="34" charset="0"/>
+                <a:cs typeface="Tahoma" panose="020B0604030504040204" pitchFamily="34" charset="0"/>
+              </a:rPr>
+              <a:t>.code </a:t>
+            </a:r>
+          </a:p>
+          <a:p>
+            <a:r>
+              <a:rPr lang="en-US" sz="1400" dirty="0">
+                <a:solidFill>
+                  <a:schemeClr val="tx2"/>
+                </a:solidFill>
+                <a:latin typeface="Tahoma" panose="020B0604030504040204" pitchFamily="34" charset="0"/>
+                <a:ea typeface="Tahoma" panose="020B0604030504040204" pitchFamily="34" charset="0"/>
+                <a:cs typeface="Tahoma" panose="020B0604030504040204" pitchFamily="34" charset="0"/>
+              </a:rPr>
+              <a:t>add eax, 10</a:t>
+            </a:r>
+          </a:p>
+          <a:p>
+            <a:r>
+              <a:rPr lang="en-US" sz="1400" dirty="0">
+                <a:solidFill>
+                  <a:schemeClr val="tx2"/>
+                </a:solidFill>
+                <a:latin typeface="Tahoma" panose="020B0604030504040204" pitchFamily="34" charset="0"/>
+                <a:ea typeface="Tahoma" panose="020B0604030504040204" pitchFamily="34" charset="0"/>
+                <a:cs typeface="Tahoma" panose="020B0604030504040204" pitchFamily="34" charset="0"/>
+              </a:rPr>
+              <a:t>.code </a:t>
+            </a:r>
+          </a:p>
+          <a:p>
+            <a:r>
+              <a:rPr lang="en-US" sz="1400" dirty="0" err="1">
+                <a:solidFill>
+                  <a:schemeClr val="tx2"/>
+                </a:solidFill>
+                <a:latin typeface="Tahoma" panose="020B0604030504040204" pitchFamily="34" charset="0"/>
+                <a:ea typeface="Tahoma" panose="020B0604030504040204" pitchFamily="34" charset="0"/>
+                <a:cs typeface="Tahoma" panose="020B0604030504040204" pitchFamily="34" charset="0"/>
+              </a:rPr>
+              <a:t>addTenEAX</a:t>
+            </a:r>
+            <a:endParaRPr lang="en-US" sz="1400" dirty="0">
+              <a:solidFill>
+                <a:schemeClr val="tx2"/>
+              </a:solidFill>
+              <a:latin typeface="Tahoma" panose="020B0604030504040204" pitchFamily="34" charset="0"/>
+              <a:ea typeface="Tahoma" panose="020B0604030504040204" pitchFamily="34" charset="0"/>
+              <a:cs typeface="Tahoma" panose="020B0604030504040204" pitchFamily="34" charset="0"/>
+            </a:endParaRPr>
+          </a:p>
+        </p:txBody>
+      </p:sp>
+    </p:spTree>
+    <p:extLst>
+      <p:ext uri="{BB962C8B-B14F-4D97-AF65-F5344CB8AC3E}">
+        <p14:creationId xmlns:p14="http://schemas.microsoft.com/office/powerpoint/2010/main" val="762197295"/>
+      </p:ext>
+    </p:extLst>
+  </p:cSld>
+  <p:clrMapOvr>
+    <a:masterClrMapping/>
+  </p:clrMapOvr>
+  <mc:AlternateContent xmlns:mc="http://schemas.openxmlformats.org/markup-compatibility/2006" xmlns:p14="http://schemas.microsoft.com/office/powerpoint/2010/main">
+    <mc:Choice Requires="p14">
+      <p:transition spd="slow" p14:dur="1250">
+        <p14:flip dir="r"/>
+      </p:transition>
+    </mc:Choice>
+    <mc:Fallback xmlns="">
+      <p:transition spd="slow">
+        <p:fade/>
+      </p:transition>
+    </mc:Fallback>
+  </mc:AlternateContent>
+</p:sld>
+</file>
+
+<file path=ppt/slides/slide21.xml><?xml version="1.0" encoding="utf-8"?>
+<p:sld xmlns:a="http://schemas.openxmlformats.org/drawingml/2006/main" xmlns:r="http://schemas.openxmlformats.org/officeDocument/2006/relationships" xmlns:p="http://schemas.openxmlformats.org/presentationml/2006/main">
+  <p:cSld>
+    <p:spTree>
+      <p:nvGrpSpPr>
+        <p:cNvPr id="1" name=""/>
+        <p:cNvGrpSpPr/>
+        <p:nvPr/>
+      </p:nvGrpSpPr>
+      <p:grpSpPr>
+        <a:xfrm>
+          <a:off x="0" y="0"/>
+          <a:ext cx="0" cy="0"/>
+          <a:chOff x="0" y="0"/>
+          <a:chExt cx="0" cy="0"/>
+        </a:xfrm>
+      </p:grpSpPr>
+      <p:sp>
+        <p:nvSpPr>
+          <p:cNvPr id="2" name="Title 1">
+            <a:extLst>
+              <a:ext uri="{FF2B5EF4-FFF2-40B4-BE49-F238E27FC236}">
+                <a16:creationId xmlns:a16="http://schemas.microsoft.com/office/drawing/2014/main" id="{C6466A7A-BAA9-4922-81DF-E958EDBA80CF}"/>
+              </a:ext>
+            </a:extLst>
+          </p:cNvPr>
+          <p:cNvSpPr>
+            <a:spLocks noGrp="1"/>
+          </p:cNvSpPr>
+          <p:nvPr>
+            <p:ph type="ctrTitle" idx="4294967295"/>
+          </p:nvPr>
+        </p:nvSpPr>
+        <p:spPr>
+          <a:xfrm>
+            <a:off x="1150215" y="452531"/>
+            <a:ext cx="8361363" cy="552450"/>
+          </a:xfrm>
+        </p:spPr>
+        <p:txBody>
+          <a:bodyPr>
+            <a:normAutofit fontScale="90000"/>
+          </a:bodyPr>
+          <a:lstStyle/>
+          <a:p>
+            <a:r>
+              <a:rPr lang="en-US" sz="4400" dirty="0"/>
+              <a:t>DEMO</a:t>
+            </a:r>
+          </a:p>
+        </p:txBody>
+      </p:sp>
+      <p:sp>
+        <p:nvSpPr>
+          <p:cNvPr id="3" name="Subtitle 2">
+            <a:extLst>
+              <a:ext uri="{FF2B5EF4-FFF2-40B4-BE49-F238E27FC236}">
+                <a16:creationId xmlns:a16="http://schemas.microsoft.com/office/drawing/2014/main" id="{E536BDF3-8BC3-4705-A0E0-23EED5878F87}"/>
+              </a:ext>
+            </a:extLst>
+          </p:cNvPr>
+          <p:cNvSpPr>
+            <a:spLocks noGrp="1"/>
+          </p:cNvSpPr>
+          <p:nvPr>
+            <p:ph type="subTitle" idx="4294967295"/>
+          </p:nvPr>
+        </p:nvSpPr>
+        <p:spPr>
+          <a:xfrm>
+            <a:off x="1150300" y="1227138"/>
+            <a:ext cx="9972675" cy="4928002"/>
+          </a:xfrm>
+        </p:spPr>
+        <p:txBody>
+          <a:bodyPr>
+            <a:normAutofit/>
+          </a:bodyPr>
+          <a:lstStyle/>
+          <a:p>
+            <a:r>
+              <a:rPr lang="en-US" sz="1600" dirty="0">
+                <a:solidFill>
+                  <a:schemeClr val="tx2"/>
+                </a:solidFill>
+                <a:latin typeface="Tahoma" panose="020B0604030504040204" pitchFamily="34" charset="0"/>
+                <a:ea typeface="Tahoma" panose="020B0604030504040204" pitchFamily="34" charset="0"/>
+                <a:cs typeface="Tahoma" panose="020B0604030504040204" pitchFamily="34" charset="0"/>
+              </a:rPr>
+              <a:t>Fibonacci sequence</a:t>
+            </a:r>
+          </a:p>
+          <a:p>
+            <a:endParaRPr lang="en-US" sz="1600" dirty="0">
+              <a:solidFill>
+                <a:schemeClr val="tx2"/>
+              </a:solidFill>
+              <a:latin typeface="Tahoma" panose="020B0604030504040204" pitchFamily="34" charset="0"/>
+              <a:ea typeface="Tahoma" panose="020B0604030504040204" pitchFamily="34" charset="0"/>
+              <a:cs typeface="Tahoma" panose="020B0604030504040204" pitchFamily="34" charset="0"/>
+            </a:endParaRPr>
+          </a:p>
+          <a:p>
+            <a:r>
+              <a:rPr lang="en-US" sz="1600" dirty="0">
+                <a:solidFill>
+                  <a:schemeClr val="tx2"/>
+                </a:solidFill>
+                <a:latin typeface="Tahoma" panose="020B0604030504040204" pitchFamily="34" charset="0"/>
+                <a:ea typeface="Tahoma" panose="020B0604030504040204" pitchFamily="34" charset="0"/>
+                <a:cs typeface="Tahoma" panose="020B0604030504040204" pitchFamily="34" charset="0"/>
+              </a:rPr>
+              <a:t>https://github.com/shankar-ray/Assembly-Language-Tutorials-for-Windows/blob/master/03%20Assembly%20Language/Assembly%20Language/Assembly%20Language/Source.asm</a:t>
+            </a:r>
+          </a:p>
+        </p:txBody>
+      </p:sp>
+    </p:spTree>
+    <p:extLst>
+      <p:ext uri="{BB962C8B-B14F-4D97-AF65-F5344CB8AC3E}">
+        <p14:creationId xmlns:p14="http://schemas.microsoft.com/office/powerpoint/2010/main" val="865016956"/>
       </p:ext>
     </p:extLst>
   </p:cSld>
@@ -13533,7 +16246,37 @@
                 <a:ea typeface="Tahoma" panose="020B0604030504040204" pitchFamily="34" charset="0"/>
                 <a:cs typeface="Tahoma" panose="020B0604030504040204" pitchFamily="34" charset="0"/>
               </a:rPr>
-              <a:t>.code //program segment containing instructions</a:t>
+              <a:t>.data? //segment contains un-</a:t>
+            </a:r>
+            <a:r>
+              <a:rPr lang="en-US" sz="1400" dirty="0" err="1">
+                <a:latin typeface="Tahoma" panose="020B0604030504040204" pitchFamily="34" charset="0"/>
+                <a:ea typeface="Tahoma" panose="020B0604030504040204" pitchFamily="34" charset="0"/>
+                <a:cs typeface="Tahoma" panose="020B0604030504040204" pitchFamily="34" charset="0"/>
+              </a:rPr>
+              <a:t>initalized</a:t>
+            </a:r>
+            <a:r>
+              <a:rPr lang="en-US" sz="1400" dirty="0">
+                <a:latin typeface="Tahoma" panose="020B0604030504040204" pitchFamily="34" charset="0"/>
+                <a:ea typeface="Tahoma" panose="020B0604030504040204" pitchFamily="34" charset="0"/>
+                <a:cs typeface="Tahoma" panose="020B0604030504040204" pitchFamily="34" charset="0"/>
+              </a:rPr>
+              <a:t> data</a:t>
+            </a:r>
+          </a:p>
+          <a:p>
+            <a:pPr marL="914400" lvl="1" indent="-457200" algn="l">
+              <a:buFont typeface="Arial" panose="020B0604020202020204" pitchFamily="34" charset="0"/>
+              <a:buChar char="•"/>
+            </a:pPr>
+            <a:r>
+              <a:rPr lang="en-US" sz="1400" dirty="0">
+                <a:latin typeface="Tahoma" panose="020B0604030504040204" pitchFamily="34" charset="0"/>
+                <a:ea typeface="Tahoma" panose="020B0604030504040204" pitchFamily="34" charset="0"/>
+                <a:cs typeface="Tahoma" panose="020B0604030504040204" pitchFamily="34" charset="0"/>
+              </a:rPr>
+              <a:t>.code //segment containing instructions</a:t>
             </a:r>
           </a:p>
           <a:p>

</xml_diff>

<commit_message>
added program skeletons 32-bit and 64-bit
</commit_message>
<xml_diff>
--- a/03 Assembly Language/Assembly Language.pptx
+++ b/03 Assembly Language/Assembly Language.pptx
@@ -6205,7 +6205,7 @@
           <a:p>
             <a:fld id="{E8DC62A2-CA51-4DE6-9EB4-2B31184897F4}" type="datetimeFigureOut">
               <a:rPr lang="en-US" smtClean="0"/>
-              <a:t>3/23/2018</a:t>
+              <a:t>3/24/2018</a:t>
             </a:fld>
             <a:endParaRPr lang="en-US"/>
           </a:p>
@@ -6866,7 +6866,7 @@
           <a:p>
             <a:fld id="{C619A8D2-2616-4635-9C0D-88FB85C3F02D}" type="datetimeFigureOut">
               <a:rPr lang="en-US" smtClean="0"/>
-              <a:t>3/23/2018</a:t>
+              <a:t>3/24/2018</a:t>
             </a:fld>
             <a:endParaRPr lang="en-US"/>
           </a:p>
@@ -7074,7 +7074,7 @@
           <a:p>
             <a:fld id="{C619A8D2-2616-4635-9C0D-88FB85C3F02D}" type="datetimeFigureOut">
               <a:rPr lang="en-US" smtClean="0"/>
-              <a:t>3/23/2018</a:t>
+              <a:t>3/24/2018</a:t>
             </a:fld>
             <a:endParaRPr lang="en-US"/>
           </a:p>
@@ -7330,7 +7330,7 @@
           <a:p>
             <a:fld id="{C619A8D2-2616-4635-9C0D-88FB85C3F02D}" type="datetimeFigureOut">
               <a:rPr lang="en-US" smtClean="0"/>
-              <a:t>3/23/2018</a:t>
+              <a:t>3/24/2018</a:t>
             </a:fld>
             <a:endParaRPr lang="en-US"/>
           </a:p>
@@ -7504,7 +7504,7 @@
           <a:p>
             <a:fld id="{C619A8D2-2616-4635-9C0D-88FB85C3F02D}" type="datetimeFigureOut">
               <a:rPr lang="en-US" smtClean="0"/>
-              <a:t>3/23/2018</a:t>
+              <a:t>3/24/2018</a:t>
             </a:fld>
             <a:endParaRPr lang="en-US"/>
           </a:p>
@@ -7847,7 +7847,7 @@
           <a:p>
             <a:fld id="{C619A8D2-2616-4635-9C0D-88FB85C3F02D}" type="datetimeFigureOut">
               <a:rPr lang="en-US" smtClean="0"/>
-              <a:t>3/23/2018</a:t>
+              <a:t>3/24/2018</a:t>
             </a:fld>
             <a:endParaRPr lang="en-US"/>
           </a:p>
@@ -8122,7 +8122,7 @@
           <a:p>
             <a:fld id="{C619A8D2-2616-4635-9C0D-88FB85C3F02D}" type="datetimeFigureOut">
               <a:rPr lang="en-US" smtClean="0"/>
-              <a:t>3/23/2018</a:t>
+              <a:t>3/24/2018</a:t>
             </a:fld>
             <a:endParaRPr lang="en-US"/>
           </a:p>
@@ -8506,7 +8506,7 @@
           <a:p>
             <a:fld id="{C619A8D2-2616-4635-9C0D-88FB85C3F02D}" type="datetimeFigureOut">
               <a:rPr lang="en-US" smtClean="0"/>
-              <a:t>3/23/2018</a:t>
+              <a:t>3/24/2018</a:t>
             </a:fld>
             <a:endParaRPr lang="en-US"/>
           </a:p>
@@ -8629,7 +8629,7 @@
           <a:p>
             <a:fld id="{C619A8D2-2616-4635-9C0D-88FB85C3F02D}" type="datetimeFigureOut">
               <a:rPr lang="en-US" smtClean="0"/>
-              <a:t>3/23/2018</a:t>
+              <a:t>3/24/2018</a:t>
             </a:fld>
             <a:endParaRPr lang="en-US"/>
           </a:p>
@@ -8800,7 +8800,7 @@
           <a:p>
             <a:fld id="{C619A8D2-2616-4635-9C0D-88FB85C3F02D}" type="datetimeFigureOut">
               <a:rPr lang="en-US" smtClean="0"/>
-              <a:t>3/23/2018</a:t>
+              <a:t>3/24/2018</a:t>
             </a:fld>
             <a:endParaRPr lang="en-US"/>
           </a:p>
@@ -9154,7 +9154,7 @@
           <a:p>
             <a:fld id="{C619A8D2-2616-4635-9C0D-88FB85C3F02D}" type="datetimeFigureOut">
               <a:rPr lang="en-US" smtClean="0"/>
-              <a:t>3/23/2018</a:t>
+              <a:t>3/24/2018</a:t>
             </a:fld>
             <a:endParaRPr lang="en-US"/>
           </a:p>
@@ -9541,7 +9541,7 @@
           <a:p>
             <a:fld id="{C619A8D2-2616-4635-9C0D-88FB85C3F02D}" type="datetimeFigureOut">
               <a:rPr lang="en-US" smtClean="0"/>
-              <a:t>3/23/2018</a:t>
+              <a:t>3/24/2018</a:t>
             </a:fld>
             <a:endParaRPr lang="en-US"/>
           </a:p>
@@ -9828,7 +9828,7 @@
           <a:p>
             <a:fld id="{C619A8D2-2616-4635-9C0D-88FB85C3F02D}" type="datetimeFigureOut">
               <a:rPr lang="en-US" smtClean="0"/>
-              <a:t>3/23/2018</a:t>
+              <a:t>3/24/2018</a:t>
             </a:fld>
             <a:endParaRPr lang="en-US"/>
           </a:p>
@@ -14083,7 +14083,7 @@
                 <a:ea typeface="Tahoma" panose="020B0604030504040204" pitchFamily="34" charset="0"/>
                 <a:cs typeface="Tahoma" panose="020B0604030504040204" pitchFamily="34" charset="0"/>
               </a:rPr>
-              <a:t>Fibonacci sequence</a:t>
+              <a:t>Even-odd</a:t>
             </a:r>
           </a:p>
           <a:p>
@@ -14106,7 +14106,7 @@
                 <a:ea typeface="Tahoma" panose="020B0604030504040204" pitchFamily="34" charset="0"/>
                 <a:cs typeface="Tahoma" panose="020B0604030504040204" pitchFamily="34" charset="0"/>
               </a:rPr>
-              <a:t>https://github.com/shankar-ray/Assembly-Language-Tutorials-for-Windows/blob/master/03%20Assembly%20Language/Assembly%20Language/Assembly%20Language/Source.asm</a:t>
+              <a:t>https://github.com/shankar-ray/Assembly-Language-Tutorials-for-Windows/tree/master/03%20Assembly%20Language</a:t>
             </a:r>
           </a:p>
         </p:txBody>
@@ -16246,23 +16246,7 @@
                 <a:ea typeface="Tahoma" panose="020B0604030504040204" pitchFamily="34" charset="0"/>
                 <a:cs typeface="Tahoma" panose="020B0604030504040204" pitchFamily="34" charset="0"/>
               </a:rPr>
-              <a:t>.data? //segment contains un-</a:t>
-            </a:r>
-            <a:r>
-              <a:rPr lang="en-US" sz="1400" dirty="0" err="1">
-                <a:latin typeface="Tahoma" panose="020B0604030504040204" pitchFamily="34" charset="0"/>
-                <a:ea typeface="Tahoma" panose="020B0604030504040204" pitchFamily="34" charset="0"/>
-                <a:cs typeface="Tahoma" panose="020B0604030504040204" pitchFamily="34" charset="0"/>
-              </a:rPr>
-              <a:t>initalized</a:t>
-            </a:r>
-            <a:r>
-              <a:rPr lang="en-US" sz="1400" dirty="0">
-                <a:latin typeface="Tahoma" panose="020B0604030504040204" pitchFamily="34" charset="0"/>
-                <a:ea typeface="Tahoma" panose="020B0604030504040204" pitchFamily="34" charset="0"/>
-                <a:cs typeface="Tahoma" panose="020B0604030504040204" pitchFamily="34" charset="0"/>
-              </a:rPr>
-              <a:t> data</a:t>
+              <a:t>.data? //segment contains un-initialized data</a:t>
             </a:r>
           </a:p>
           <a:p>

</xml_diff>